<commit_message>
- Upgrade to Unity 5.6.5f1
</commit_message>
<xml_diff>
--- a/TutoUnityFull.pptx
+++ b/TutoUnityFull.pptx
@@ -4,23 +4,21 @@
   <p:sldMasterIdLst>
     <p:sldMasterId id="2147483648" r:id="rId1"/>
   </p:sldMasterIdLst>
+  <p:notesMasterIdLst>
+    <p:notesMasterId r:id="rId13"/>
+  </p:notesMasterIdLst>
   <p:sldIdLst>
     <p:sldId id="256" r:id="rId2"/>
     <p:sldId id="257" r:id="rId3"/>
     <p:sldId id="262" r:id="rId4"/>
     <p:sldId id="263" r:id="rId5"/>
     <p:sldId id="258" r:id="rId6"/>
-    <p:sldId id="264" r:id="rId7"/>
-    <p:sldId id="259" r:id="rId8"/>
-    <p:sldId id="261" r:id="rId9"/>
-    <p:sldId id="272" r:id="rId10"/>
-    <p:sldId id="265" r:id="rId11"/>
-    <p:sldId id="266" r:id="rId12"/>
-    <p:sldId id="267" r:id="rId13"/>
-    <p:sldId id="268" r:id="rId14"/>
-    <p:sldId id="269" r:id="rId15"/>
-    <p:sldId id="270" r:id="rId16"/>
-    <p:sldId id="271" r:id="rId17"/>
+    <p:sldId id="259" r:id="rId7"/>
+    <p:sldId id="264" r:id="rId8"/>
+    <p:sldId id="272" r:id="rId9"/>
+    <p:sldId id="273" r:id="rId10"/>
+    <p:sldId id="261" r:id="rId11"/>
+    <p:sldId id="265" r:id="rId12"/>
   </p:sldIdLst>
   <p:sldSz cx="9144000" cy="6858000" type="screen4x3"/>
   <p:notesSz cx="6858000" cy="9144000"/>
@@ -119,7 +117,716 @@
       </a:defRPr>
     </a:lvl9pPr>
   </p:defaultTextStyle>
+  <p:extLst>
+    <p:ext uri="{EFAFB233-063F-42B5-8137-9DF3F51BA10A}">
+      <p15:sldGuideLst xmlns:p15="http://schemas.microsoft.com/office/powerpoint/2012/main">
+        <p15:guide id="1" orient="horz" pos="2160">
+          <p15:clr>
+            <a:srgbClr val="A4A3A4"/>
+          </p15:clr>
+        </p15:guide>
+        <p15:guide id="2" pos="2880">
+          <p15:clr>
+            <a:srgbClr val="A4A3A4"/>
+          </p15:clr>
+        </p15:guide>
+      </p15:sldGuideLst>
+    </p:ext>
+  </p:extLst>
 </p:presentation>
+</file>
+
+<file path=ppt/notesMasters/notesMaster1.xml><?xml version="1.0" encoding="utf-8"?>
+<p:notesMaster xmlns:a="http://schemas.openxmlformats.org/drawingml/2006/main" xmlns:r="http://schemas.openxmlformats.org/officeDocument/2006/relationships" xmlns:p="http://schemas.openxmlformats.org/presentationml/2006/main">
+  <p:cSld>
+    <p:bg>
+      <p:bgRef idx="1001">
+        <a:schemeClr val="bg1"/>
+      </p:bgRef>
+    </p:bg>
+    <p:spTree>
+      <p:nvGrpSpPr>
+        <p:cNvPr id="1" name=""/>
+        <p:cNvGrpSpPr/>
+        <p:nvPr/>
+      </p:nvGrpSpPr>
+      <p:grpSpPr>
+        <a:xfrm>
+          <a:off x="0" y="0"/>
+          <a:ext cx="0" cy="0"/>
+          <a:chOff x="0" y="0"/>
+          <a:chExt cx="0" cy="0"/>
+        </a:xfrm>
+      </p:grpSpPr>
+      <p:sp>
+        <p:nvSpPr>
+          <p:cNvPr id="2" name="Espace réservé de l'en-tête 1"/>
+          <p:cNvSpPr>
+            <a:spLocks noGrp="1"/>
+          </p:cNvSpPr>
+          <p:nvPr>
+            <p:ph type="hdr" sz="quarter"/>
+          </p:nvPr>
+        </p:nvSpPr>
+        <p:spPr>
+          <a:xfrm>
+            <a:off x="0" y="0"/>
+            <a:ext cx="2971800" cy="458788"/>
+          </a:xfrm>
+          <a:prstGeom prst="rect">
+            <a:avLst/>
+          </a:prstGeom>
+        </p:spPr>
+        <p:txBody>
+          <a:bodyPr vert="horz" lIns="91440" tIns="45720" rIns="91440" bIns="45720" rtlCol="0"/>
+          <a:lstStyle>
+            <a:lvl1pPr algn="l">
+              <a:defRPr sz="1200"/>
+            </a:lvl1pPr>
+          </a:lstStyle>
+          <a:p>
+            <a:endParaRPr lang="fr-FR"/>
+          </a:p>
+        </p:txBody>
+      </p:sp>
+      <p:sp>
+        <p:nvSpPr>
+          <p:cNvPr id="3" name="Espace réservé de la date 2"/>
+          <p:cNvSpPr>
+            <a:spLocks noGrp="1"/>
+          </p:cNvSpPr>
+          <p:nvPr>
+            <p:ph type="dt" idx="1"/>
+          </p:nvPr>
+        </p:nvSpPr>
+        <p:spPr>
+          <a:xfrm>
+            <a:off x="3884613" y="0"/>
+            <a:ext cx="2971800" cy="458788"/>
+          </a:xfrm>
+          <a:prstGeom prst="rect">
+            <a:avLst/>
+          </a:prstGeom>
+        </p:spPr>
+        <p:txBody>
+          <a:bodyPr vert="horz" lIns="91440" tIns="45720" rIns="91440" bIns="45720" rtlCol="0"/>
+          <a:lstStyle>
+            <a:lvl1pPr algn="r">
+              <a:defRPr sz="1200"/>
+            </a:lvl1pPr>
+          </a:lstStyle>
+          <a:p>
+            <a:fld id="{37C9EE7E-84B9-4E33-8709-DBA664B2DB91}" type="datetimeFigureOut">
+              <a:rPr lang="fr-FR" smtClean="0"/>
+              <a:t>04/09/2018</a:t>
+            </a:fld>
+            <a:endParaRPr lang="fr-FR"/>
+          </a:p>
+        </p:txBody>
+      </p:sp>
+      <p:sp>
+        <p:nvSpPr>
+          <p:cNvPr id="4" name="Espace réservé de l'image des diapositives 3"/>
+          <p:cNvSpPr>
+            <a:spLocks noGrp="1" noRot="1" noChangeAspect="1"/>
+          </p:cNvSpPr>
+          <p:nvPr>
+            <p:ph type="sldImg" idx="2"/>
+          </p:nvPr>
+        </p:nvSpPr>
+        <p:spPr>
+          <a:xfrm>
+            <a:off x="1371600" y="1143000"/>
+            <a:ext cx="4114800" cy="3086100"/>
+          </a:xfrm>
+          <a:prstGeom prst="rect">
+            <a:avLst/>
+          </a:prstGeom>
+          <a:noFill/>
+          <a:ln w="12700">
+            <a:solidFill>
+              <a:prstClr val="black"/>
+            </a:solidFill>
+          </a:ln>
+        </p:spPr>
+        <p:txBody>
+          <a:bodyPr vert="horz" lIns="91440" tIns="45720" rIns="91440" bIns="45720" rtlCol="0" anchor="ctr"/>
+          <a:lstStyle/>
+          <a:p>
+            <a:endParaRPr lang="fr-FR"/>
+          </a:p>
+        </p:txBody>
+      </p:sp>
+      <p:sp>
+        <p:nvSpPr>
+          <p:cNvPr id="5" name="Espace réservé des notes 4"/>
+          <p:cNvSpPr>
+            <a:spLocks noGrp="1"/>
+          </p:cNvSpPr>
+          <p:nvPr>
+            <p:ph type="body" sz="quarter" idx="3"/>
+          </p:nvPr>
+        </p:nvSpPr>
+        <p:spPr>
+          <a:xfrm>
+            <a:off x="685800" y="4400550"/>
+            <a:ext cx="5486400" cy="3600450"/>
+          </a:xfrm>
+          <a:prstGeom prst="rect">
+            <a:avLst/>
+          </a:prstGeom>
+        </p:spPr>
+        <p:txBody>
+          <a:bodyPr vert="horz" lIns="91440" tIns="45720" rIns="91440" bIns="45720" rtlCol="0"/>
+          <a:lstStyle/>
+          <a:p>
+            <a:pPr lvl="0"/>
+            <a:r>
+              <a:rPr lang="fr-FR"/>
+              <a:t>Modifier les styles du texte du masque</a:t>
+            </a:r>
+          </a:p>
+          <a:p>
+            <a:pPr lvl="1"/>
+            <a:r>
+              <a:rPr lang="fr-FR"/>
+              <a:t>Deuxième niveau</a:t>
+            </a:r>
+          </a:p>
+          <a:p>
+            <a:pPr lvl="2"/>
+            <a:r>
+              <a:rPr lang="fr-FR"/>
+              <a:t>Troisième niveau</a:t>
+            </a:r>
+          </a:p>
+          <a:p>
+            <a:pPr lvl="3"/>
+            <a:r>
+              <a:rPr lang="fr-FR"/>
+              <a:t>Quatrième niveau</a:t>
+            </a:r>
+          </a:p>
+          <a:p>
+            <a:pPr lvl="4"/>
+            <a:r>
+              <a:rPr lang="fr-FR"/>
+              <a:t>Cinquième niveau</a:t>
+            </a:r>
+          </a:p>
+        </p:txBody>
+      </p:sp>
+      <p:sp>
+        <p:nvSpPr>
+          <p:cNvPr id="6" name="Espace réservé du pied de page 5"/>
+          <p:cNvSpPr>
+            <a:spLocks noGrp="1"/>
+          </p:cNvSpPr>
+          <p:nvPr>
+            <p:ph type="ftr" sz="quarter" idx="4"/>
+          </p:nvPr>
+        </p:nvSpPr>
+        <p:spPr>
+          <a:xfrm>
+            <a:off x="0" y="8685213"/>
+            <a:ext cx="2971800" cy="458787"/>
+          </a:xfrm>
+          <a:prstGeom prst="rect">
+            <a:avLst/>
+          </a:prstGeom>
+        </p:spPr>
+        <p:txBody>
+          <a:bodyPr vert="horz" lIns="91440" tIns="45720" rIns="91440" bIns="45720" rtlCol="0" anchor="b"/>
+          <a:lstStyle>
+            <a:lvl1pPr algn="l">
+              <a:defRPr sz="1200"/>
+            </a:lvl1pPr>
+          </a:lstStyle>
+          <a:p>
+            <a:endParaRPr lang="fr-FR"/>
+          </a:p>
+        </p:txBody>
+      </p:sp>
+      <p:sp>
+        <p:nvSpPr>
+          <p:cNvPr id="7" name="Espace réservé du numéro de diapositive 6"/>
+          <p:cNvSpPr>
+            <a:spLocks noGrp="1"/>
+          </p:cNvSpPr>
+          <p:nvPr>
+            <p:ph type="sldNum" sz="quarter" idx="5"/>
+          </p:nvPr>
+        </p:nvSpPr>
+        <p:spPr>
+          <a:xfrm>
+            <a:off x="3884613" y="8685213"/>
+            <a:ext cx="2971800" cy="458787"/>
+          </a:xfrm>
+          <a:prstGeom prst="rect">
+            <a:avLst/>
+          </a:prstGeom>
+        </p:spPr>
+        <p:txBody>
+          <a:bodyPr vert="horz" lIns="91440" tIns="45720" rIns="91440" bIns="45720" rtlCol="0" anchor="b"/>
+          <a:lstStyle>
+            <a:lvl1pPr algn="r">
+              <a:defRPr sz="1200"/>
+            </a:lvl1pPr>
+          </a:lstStyle>
+          <a:p>
+            <a:fld id="{8C7E3C07-F8FE-41AC-8CA2-B16D5ABD7028}" type="slidenum">
+              <a:rPr lang="fr-FR" smtClean="0"/>
+              <a:t>‹N°›</a:t>
+            </a:fld>
+            <a:endParaRPr lang="fr-FR"/>
+          </a:p>
+        </p:txBody>
+      </p:sp>
+    </p:spTree>
+    <p:extLst>
+      <p:ext uri="{BB962C8B-B14F-4D97-AF65-F5344CB8AC3E}">
+        <p14:creationId xmlns:p14="http://schemas.microsoft.com/office/powerpoint/2010/main" val="411708849"/>
+      </p:ext>
+    </p:extLst>
+  </p:cSld>
+  <p:clrMap bg1="lt1" tx1="dk1" bg2="lt2" tx2="dk2" accent1="accent1" accent2="accent2" accent3="accent3" accent4="accent4" accent5="accent5" accent6="accent6" hlink="hlink" folHlink="folHlink"/>
+  <p:notesStyle>
+    <a:lvl1pPr marL="0" algn="l" defTabSz="914400" rtl="0" eaLnBrk="1" latinLnBrk="0" hangingPunct="1">
+      <a:defRPr sz="1200" kern="1200">
+        <a:solidFill>
+          <a:schemeClr val="tx1"/>
+        </a:solidFill>
+        <a:latin typeface="+mn-lt"/>
+        <a:ea typeface="+mn-ea"/>
+        <a:cs typeface="+mn-cs"/>
+      </a:defRPr>
+    </a:lvl1pPr>
+    <a:lvl2pPr marL="457200" algn="l" defTabSz="914400" rtl="0" eaLnBrk="1" latinLnBrk="0" hangingPunct="1">
+      <a:defRPr sz="1200" kern="1200">
+        <a:solidFill>
+          <a:schemeClr val="tx1"/>
+        </a:solidFill>
+        <a:latin typeface="+mn-lt"/>
+        <a:ea typeface="+mn-ea"/>
+        <a:cs typeface="+mn-cs"/>
+      </a:defRPr>
+    </a:lvl2pPr>
+    <a:lvl3pPr marL="914400" algn="l" defTabSz="914400" rtl="0" eaLnBrk="1" latinLnBrk="0" hangingPunct="1">
+      <a:defRPr sz="1200" kern="1200">
+        <a:solidFill>
+          <a:schemeClr val="tx1"/>
+        </a:solidFill>
+        <a:latin typeface="+mn-lt"/>
+        <a:ea typeface="+mn-ea"/>
+        <a:cs typeface="+mn-cs"/>
+      </a:defRPr>
+    </a:lvl3pPr>
+    <a:lvl4pPr marL="1371600" algn="l" defTabSz="914400" rtl="0" eaLnBrk="1" latinLnBrk="0" hangingPunct="1">
+      <a:defRPr sz="1200" kern="1200">
+        <a:solidFill>
+          <a:schemeClr val="tx1"/>
+        </a:solidFill>
+        <a:latin typeface="+mn-lt"/>
+        <a:ea typeface="+mn-ea"/>
+        <a:cs typeface="+mn-cs"/>
+      </a:defRPr>
+    </a:lvl4pPr>
+    <a:lvl5pPr marL="1828800" algn="l" defTabSz="914400" rtl="0" eaLnBrk="1" latinLnBrk="0" hangingPunct="1">
+      <a:defRPr sz="1200" kern="1200">
+        <a:solidFill>
+          <a:schemeClr val="tx1"/>
+        </a:solidFill>
+        <a:latin typeface="+mn-lt"/>
+        <a:ea typeface="+mn-ea"/>
+        <a:cs typeface="+mn-cs"/>
+      </a:defRPr>
+    </a:lvl5pPr>
+    <a:lvl6pPr marL="2286000" algn="l" defTabSz="914400" rtl="0" eaLnBrk="1" latinLnBrk="0" hangingPunct="1">
+      <a:defRPr sz="1200" kern="1200">
+        <a:solidFill>
+          <a:schemeClr val="tx1"/>
+        </a:solidFill>
+        <a:latin typeface="+mn-lt"/>
+        <a:ea typeface="+mn-ea"/>
+        <a:cs typeface="+mn-cs"/>
+      </a:defRPr>
+    </a:lvl6pPr>
+    <a:lvl7pPr marL="2743200" algn="l" defTabSz="914400" rtl="0" eaLnBrk="1" latinLnBrk="0" hangingPunct="1">
+      <a:defRPr sz="1200" kern="1200">
+        <a:solidFill>
+          <a:schemeClr val="tx1"/>
+        </a:solidFill>
+        <a:latin typeface="+mn-lt"/>
+        <a:ea typeface="+mn-ea"/>
+        <a:cs typeface="+mn-cs"/>
+      </a:defRPr>
+    </a:lvl7pPr>
+    <a:lvl8pPr marL="3200400" algn="l" defTabSz="914400" rtl="0" eaLnBrk="1" latinLnBrk="0" hangingPunct="1">
+      <a:defRPr sz="1200" kern="1200">
+        <a:solidFill>
+          <a:schemeClr val="tx1"/>
+        </a:solidFill>
+        <a:latin typeface="+mn-lt"/>
+        <a:ea typeface="+mn-ea"/>
+        <a:cs typeface="+mn-cs"/>
+      </a:defRPr>
+    </a:lvl8pPr>
+    <a:lvl9pPr marL="3657600" algn="l" defTabSz="914400" rtl="0" eaLnBrk="1" latinLnBrk="0" hangingPunct="1">
+      <a:defRPr sz="1200" kern="1200">
+        <a:solidFill>
+          <a:schemeClr val="tx1"/>
+        </a:solidFill>
+        <a:latin typeface="+mn-lt"/>
+        <a:ea typeface="+mn-ea"/>
+        <a:cs typeface="+mn-cs"/>
+      </a:defRPr>
+    </a:lvl9pPr>
+  </p:notesStyle>
+</p:notesMaster>
+</file>
+
+<file path=ppt/notesSlides/notesSlide1.xml><?xml version="1.0" encoding="utf-8"?>
+<p:notes xmlns:a="http://schemas.openxmlformats.org/drawingml/2006/main" xmlns:r="http://schemas.openxmlformats.org/officeDocument/2006/relationships" xmlns:p="http://schemas.openxmlformats.org/presentationml/2006/main">
+  <p:cSld>
+    <p:spTree>
+      <p:nvGrpSpPr>
+        <p:cNvPr id="1" name=""/>
+        <p:cNvGrpSpPr/>
+        <p:nvPr/>
+      </p:nvGrpSpPr>
+      <p:grpSpPr>
+        <a:xfrm>
+          <a:off x="0" y="0"/>
+          <a:ext cx="0" cy="0"/>
+          <a:chOff x="0" y="0"/>
+          <a:chExt cx="0" cy="0"/>
+        </a:xfrm>
+      </p:grpSpPr>
+      <p:sp>
+        <p:nvSpPr>
+          <p:cNvPr id="2" name="Espace réservé de l'image des diapositives 1"/>
+          <p:cNvSpPr>
+            <a:spLocks noGrp="1" noRot="1" noChangeAspect="1"/>
+          </p:cNvSpPr>
+          <p:nvPr>
+            <p:ph type="sldImg"/>
+          </p:nvPr>
+        </p:nvSpPr>
+        <p:spPr/>
+      </p:sp>
+      <p:sp>
+        <p:nvSpPr>
+          <p:cNvPr id="3" name="Espace réservé des notes 2"/>
+          <p:cNvSpPr>
+            <a:spLocks noGrp="1"/>
+          </p:cNvSpPr>
+          <p:nvPr>
+            <p:ph type="body" idx="1"/>
+          </p:nvPr>
+        </p:nvSpPr>
+        <p:spPr/>
+        <p:txBody>
+          <a:bodyPr/>
+          <a:lstStyle/>
+          <a:p>
+            <a:endParaRPr lang="fr-FR" dirty="0"/>
+          </a:p>
+        </p:txBody>
+      </p:sp>
+      <p:sp>
+        <p:nvSpPr>
+          <p:cNvPr id="4" name="Espace réservé du numéro de diapositive 3"/>
+          <p:cNvSpPr>
+            <a:spLocks noGrp="1"/>
+          </p:cNvSpPr>
+          <p:nvPr>
+            <p:ph type="sldNum" sz="quarter" idx="10"/>
+          </p:nvPr>
+        </p:nvSpPr>
+        <p:spPr/>
+        <p:txBody>
+          <a:bodyPr/>
+          <a:lstStyle/>
+          <a:p>
+            <a:fld id="{8C7E3C07-F8FE-41AC-8CA2-B16D5ABD7028}" type="slidenum">
+              <a:rPr lang="fr-FR" smtClean="0"/>
+              <a:t>5</a:t>
+            </a:fld>
+            <a:endParaRPr lang="fr-FR"/>
+          </a:p>
+        </p:txBody>
+      </p:sp>
+    </p:spTree>
+    <p:extLst>
+      <p:ext uri="{BB962C8B-B14F-4D97-AF65-F5344CB8AC3E}">
+        <p14:creationId xmlns:p14="http://schemas.microsoft.com/office/powerpoint/2010/main" val="717633340"/>
+      </p:ext>
+    </p:extLst>
+  </p:cSld>
+  <p:clrMapOvr>
+    <a:masterClrMapping/>
+  </p:clrMapOvr>
+</p:notes>
+</file>
+
+<file path=ppt/notesSlides/notesSlide2.xml><?xml version="1.0" encoding="utf-8"?>
+<p:notes xmlns:a="http://schemas.openxmlformats.org/drawingml/2006/main" xmlns:r="http://schemas.openxmlformats.org/officeDocument/2006/relationships" xmlns:p="http://schemas.openxmlformats.org/presentationml/2006/main">
+  <p:cSld>
+    <p:spTree>
+      <p:nvGrpSpPr>
+        <p:cNvPr id="1" name=""/>
+        <p:cNvGrpSpPr/>
+        <p:nvPr/>
+      </p:nvGrpSpPr>
+      <p:grpSpPr>
+        <a:xfrm>
+          <a:off x="0" y="0"/>
+          <a:ext cx="0" cy="0"/>
+          <a:chOff x="0" y="0"/>
+          <a:chExt cx="0" cy="0"/>
+        </a:xfrm>
+      </p:grpSpPr>
+      <p:sp>
+        <p:nvSpPr>
+          <p:cNvPr id="2" name="Espace réservé de l'image des diapositives 1"/>
+          <p:cNvSpPr>
+            <a:spLocks noGrp="1" noRot="1" noChangeAspect="1"/>
+          </p:cNvSpPr>
+          <p:nvPr>
+            <p:ph type="sldImg"/>
+          </p:nvPr>
+        </p:nvSpPr>
+        <p:spPr/>
+      </p:sp>
+      <p:sp>
+        <p:nvSpPr>
+          <p:cNvPr id="3" name="Espace réservé des notes 2"/>
+          <p:cNvSpPr>
+            <a:spLocks noGrp="1"/>
+          </p:cNvSpPr>
+          <p:nvPr>
+            <p:ph type="body" idx="1"/>
+          </p:nvPr>
+        </p:nvSpPr>
+        <p:spPr/>
+        <p:txBody>
+          <a:bodyPr/>
+          <a:lstStyle/>
+          <a:p>
+            <a:r>
+              <a:rPr lang="fr-FR" dirty="0"/>
+              <a:t>Schéma avec les Timeline : Update &amp; </a:t>
+            </a:r>
+            <a:r>
+              <a:rPr lang="fr-FR" dirty="0" err="1"/>
+              <a:t>FixedUpdate</a:t>
+            </a:r>
+            <a:endParaRPr lang="fr-FR" dirty="0"/>
+          </a:p>
+        </p:txBody>
+      </p:sp>
+      <p:sp>
+        <p:nvSpPr>
+          <p:cNvPr id="4" name="Espace réservé du numéro de diapositive 3"/>
+          <p:cNvSpPr>
+            <a:spLocks noGrp="1"/>
+          </p:cNvSpPr>
+          <p:nvPr>
+            <p:ph type="sldNum" sz="quarter" idx="10"/>
+          </p:nvPr>
+        </p:nvSpPr>
+        <p:spPr/>
+        <p:txBody>
+          <a:bodyPr/>
+          <a:lstStyle/>
+          <a:p>
+            <a:fld id="{8C7E3C07-F8FE-41AC-8CA2-B16D5ABD7028}" type="slidenum">
+              <a:rPr lang="fr-FR" smtClean="0"/>
+              <a:t>6</a:t>
+            </a:fld>
+            <a:endParaRPr lang="fr-FR"/>
+          </a:p>
+        </p:txBody>
+      </p:sp>
+    </p:spTree>
+    <p:extLst>
+      <p:ext uri="{BB962C8B-B14F-4D97-AF65-F5344CB8AC3E}">
+        <p14:creationId xmlns:p14="http://schemas.microsoft.com/office/powerpoint/2010/main" val="1084650505"/>
+      </p:ext>
+    </p:extLst>
+  </p:cSld>
+  <p:clrMapOvr>
+    <a:masterClrMapping/>
+  </p:clrMapOvr>
+</p:notes>
+</file>
+
+<file path=ppt/notesSlides/notesSlide3.xml><?xml version="1.0" encoding="utf-8"?>
+<p:notes xmlns:a="http://schemas.openxmlformats.org/drawingml/2006/main" xmlns:r="http://schemas.openxmlformats.org/officeDocument/2006/relationships" xmlns:p="http://schemas.openxmlformats.org/presentationml/2006/main">
+  <p:cSld>
+    <p:spTree>
+      <p:nvGrpSpPr>
+        <p:cNvPr id="1" name=""/>
+        <p:cNvGrpSpPr/>
+        <p:nvPr/>
+      </p:nvGrpSpPr>
+      <p:grpSpPr>
+        <a:xfrm>
+          <a:off x="0" y="0"/>
+          <a:ext cx="0" cy="0"/>
+          <a:chOff x="0" y="0"/>
+          <a:chExt cx="0" cy="0"/>
+        </a:xfrm>
+      </p:grpSpPr>
+      <p:sp>
+        <p:nvSpPr>
+          <p:cNvPr id="2" name="Espace réservé de l'image des diapositives 1"/>
+          <p:cNvSpPr>
+            <a:spLocks noGrp="1" noRot="1" noChangeAspect="1"/>
+          </p:cNvSpPr>
+          <p:nvPr>
+            <p:ph type="sldImg"/>
+          </p:nvPr>
+        </p:nvSpPr>
+        <p:spPr/>
+      </p:sp>
+      <p:sp>
+        <p:nvSpPr>
+          <p:cNvPr id="3" name="Espace réservé des notes 2"/>
+          <p:cNvSpPr>
+            <a:spLocks noGrp="1"/>
+          </p:cNvSpPr>
+          <p:nvPr>
+            <p:ph type="body" idx="1"/>
+          </p:nvPr>
+        </p:nvSpPr>
+        <p:spPr/>
+        <p:txBody>
+          <a:bodyPr/>
+          <a:lstStyle/>
+          <a:p>
+            <a:endParaRPr lang="fr-FR" dirty="0"/>
+          </a:p>
+        </p:txBody>
+      </p:sp>
+      <p:sp>
+        <p:nvSpPr>
+          <p:cNvPr id="4" name="Espace réservé du numéro de diapositive 3"/>
+          <p:cNvSpPr>
+            <a:spLocks noGrp="1"/>
+          </p:cNvSpPr>
+          <p:nvPr>
+            <p:ph type="sldNum" sz="quarter" idx="10"/>
+          </p:nvPr>
+        </p:nvSpPr>
+        <p:spPr/>
+        <p:txBody>
+          <a:bodyPr/>
+          <a:lstStyle/>
+          <a:p>
+            <a:fld id="{8C7E3C07-F8FE-41AC-8CA2-B16D5ABD7028}" type="slidenum">
+              <a:rPr lang="fr-FR" smtClean="0"/>
+              <a:t>8</a:t>
+            </a:fld>
+            <a:endParaRPr lang="fr-FR"/>
+          </a:p>
+        </p:txBody>
+      </p:sp>
+    </p:spTree>
+    <p:extLst>
+      <p:ext uri="{BB962C8B-B14F-4D97-AF65-F5344CB8AC3E}">
+        <p14:creationId xmlns:p14="http://schemas.microsoft.com/office/powerpoint/2010/main" val="2125447775"/>
+      </p:ext>
+    </p:extLst>
+  </p:cSld>
+  <p:clrMapOvr>
+    <a:masterClrMapping/>
+  </p:clrMapOvr>
+</p:notes>
+</file>
+
+<file path=ppt/notesSlides/notesSlide4.xml><?xml version="1.0" encoding="utf-8"?>
+<p:notes xmlns:a="http://schemas.openxmlformats.org/drawingml/2006/main" xmlns:r="http://schemas.openxmlformats.org/officeDocument/2006/relationships" xmlns:p="http://schemas.openxmlformats.org/presentationml/2006/main">
+  <p:cSld>
+    <p:spTree>
+      <p:nvGrpSpPr>
+        <p:cNvPr id="1" name=""/>
+        <p:cNvGrpSpPr/>
+        <p:nvPr/>
+      </p:nvGrpSpPr>
+      <p:grpSpPr>
+        <a:xfrm>
+          <a:off x="0" y="0"/>
+          <a:ext cx="0" cy="0"/>
+          <a:chOff x="0" y="0"/>
+          <a:chExt cx="0" cy="0"/>
+        </a:xfrm>
+      </p:grpSpPr>
+      <p:sp>
+        <p:nvSpPr>
+          <p:cNvPr id="2" name="Espace réservé de l'image des diapositives 1"/>
+          <p:cNvSpPr>
+            <a:spLocks noGrp="1" noRot="1" noChangeAspect="1"/>
+          </p:cNvSpPr>
+          <p:nvPr>
+            <p:ph type="sldImg"/>
+          </p:nvPr>
+        </p:nvSpPr>
+        <p:spPr/>
+      </p:sp>
+      <p:sp>
+        <p:nvSpPr>
+          <p:cNvPr id="3" name="Espace réservé des notes 2"/>
+          <p:cNvSpPr>
+            <a:spLocks noGrp="1"/>
+          </p:cNvSpPr>
+          <p:nvPr>
+            <p:ph type="body" idx="1"/>
+          </p:nvPr>
+        </p:nvSpPr>
+        <p:spPr/>
+        <p:txBody>
+          <a:bodyPr/>
+          <a:lstStyle/>
+          <a:p>
+            <a:endParaRPr lang="fr-FR" dirty="0"/>
+          </a:p>
+        </p:txBody>
+      </p:sp>
+      <p:sp>
+        <p:nvSpPr>
+          <p:cNvPr id="4" name="Espace réservé du numéro de diapositive 3"/>
+          <p:cNvSpPr>
+            <a:spLocks noGrp="1"/>
+          </p:cNvSpPr>
+          <p:nvPr>
+            <p:ph type="sldNum" sz="quarter" idx="10"/>
+          </p:nvPr>
+        </p:nvSpPr>
+        <p:spPr/>
+        <p:txBody>
+          <a:bodyPr/>
+          <a:lstStyle/>
+          <a:p>
+            <a:fld id="{8C7E3C07-F8FE-41AC-8CA2-B16D5ABD7028}" type="slidenum">
+              <a:rPr lang="fr-FR" smtClean="0"/>
+              <a:t>11</a:t>
+            </a:fld>
+            <a:endParaRPr lang="fr-FR"/>
+          </a:p>
+        </p:txBody>
+      </p:sp>
+    </p:spTree>
+    <p:extLst>
+      <p:ext uri="{BB962C8B-B14F-4D97-AF65-F5344CB8AC3E}">
+        <p14:creationId xmlns:p14="http://schemas.microsoft.com/office/powerpoint/2010/main" val="1218128105"/>
+      </p:ext>
+    </p:extLst>
+  </p:cSld>
+  <p:clrMapOvr>
+    <a:masterClrMapping/>
+  </p:clrMapOvr>
+</p:notes>
 </file>
 
 <file path=ppt/slideLayouts/slideLayout1.xml><?xml version="1.0" encoding="utf-8"?>
@@ -160,10 +867,9 @@
           <a:lstStyle/>
           <a:p>
             <a:r>
-              <a:rPr lang="en-US" smtClean="0"/>
+              <a:rPr lang="en-US"/>
               <a:t>Click to edit Master title style</a:t>
             </a:r>
-            <a:endParaRPr lang="en-US"/>
           </a:p>
         </p:txBody>
       </p:sp>
@@ -279,10 +985,9 @@
           </a:lstStyle>
           <a:p>
             <a:r>
-              <a:rPr lang="en-US" smtClean="0"/>
+              <a:rPr lang="en-US"/>
               <a:t>Click to edit Master subtitle style</a:t>
             </a:r>
-            <a:endParaRPr lang="en-US"/>
           </a:p>
         </p:txBody>
       </p:sp>
@@ -304,7 +1009,7 @@
             <a:fld id="{1D8BD707-D9CF-40AE-B4C6-C98DA3205C09}" type="datetimeFigureOut">
               <a:rPr lang="en-US" smtClean="0"/>
               <a:pPr/>
-              <a:t>1/28/2016</a:t>
+              <a:t>9/4/2018</a:t>
             </a:fld>
             <a:endParaRPr lang="en-US"/>
           </a:p>
@@ -394,10 +1099,9 @@
           <a:lstStyle/>
           <a:p>
             <a:r>
-              <a:rPr lang="en-US" smtClean="0"/>
+              <a:rPr lang="en-US"/>
               <a:t>Click to edit Master title style</a:t>
             </a:r>
-            <a:endParaRPr lang="en-US"/>
           </a:p>
         </p:txBody>
       </p:sp>
@@ -418,38 +1122,37 @@
           <a:p>
             <a:pPr lvl="0"/>
             <a:r>
-              <a:rPr lang="en-US" smtClean="0"/>
+              <a:rPr lang="en-US"/>
               <a:t>Click to edit Master text styles</a:t>
             </a:r>
           </a:p>
           <a:p>
             <a:pPr lvl="1"/>
             <a:r>
-              <a:rPr lang="en-US" smtClean="0"/>
+              <a:rPr lang="en-US"/>
               <a:t>Second level</a:t>
             </a:r>
           </a:p>
           <a:p>
             <a:pPr lvl="2"/>
             <a:r>
-              <a:rPr lang="en-US" smtClean="0"/>
+              <a:rPr lang="en-US"/>
               <a:t>Third level</a:t>
             </a:r>
           </a:p>
           <a:p>
             <a:pPr lvl="3"/>
             <a:r>
-              <a:rPr lang="en-US" smtClean="0"/>
+              <a:rPr lang="en-US"/>
               <a:t>Fourth level</a:t>
             </a:r>
           </a:p>
           <a:p>
             <a:pPr lvl="4"/>
             <a:r>
-              <a:rPr lang="en-US" smtClean="0"/>
+              <a:rPr lang="en-US"/>
               <a:t>Fifth level</a:t>
             </a:r>
-            <a:endParaRPr lang="en-US"/>
           </a:p>
         </p:txBody>
       </p:sp>
@@ -471,7 +1174,7 @@
             <a:fld id="{1D8BD707-D9CF-40AE-B4C6-C98DA3205C09}" type="datetimeFigureOut">
               <a:rPr lang="en-US" smtClean="0"/>
               <a:pPr/>
-              <a:t>1/28/2016</a:t>
+              <a:t>9/4/2018</a:t>
             </a:fld>
             <a:endParaRPr lang="en-US"/>
           </a:p>
@@ -566,10 +1269,9 @@
           <a:lstStyle/>
           <a:p>
             <a:r>
-              <a:rPr lang="en-US" smtClean="0"/>
+              <a:rPr lang="en-US"/>
               <a:t>Click to edit Master title style</a:t>
             </a:r>
-            <a:endParaRPr lang="en-US"/>
           </a:p>
         </p:txBody>
       </p:sp>
@@ -595,38 +1297,37 @@
           <a:p>
             <a:pPr lvl="0"/>
             <a:r>
-              <a:rPr lang="en-US" smtClean="0"/>
+              <a:rPr lang="en-US"/>
               <a:t>Click to edit Master text styles</a:t>
             </a:r>
           </a:p>
           <a:p>
             <a:pPr lvl="1"/>
             <a:r>
-              <a:rPr lang="en-US" smtClean="0"/>
+              <a:rPr lang="en-US"/>
               <a:t>Second level</a:t>
             </a:r>
           </a:p>
           <a:p>
             <a:pPr lvl="2"/>
             <a:r>
-              <a:rPr lang="en-US" smtClean="0"/>
+              <a:rPr lang="en-US"/>
               <a:t>Third level</a:t>
             </a:r>
           </a:p>
           <a:p>
             <a:pPr lvl="3"/>
             <a:r>
-              <a:rPr lang="en-US" smtClean="0"/>
+              <a:rPr lang="en-US"/>
               <a:t>Fourth level</a:t>
             </a:r>
           </a:p>
           <a:p>
             <a:pPr lvl="4"/>
             <a:r>
-              <a:rPr lang="en-US" smtClean="0"/>
+              <a:rPr lang="en-US"/>
               <a:t>Fifth level</a:t>
             </a:r>
-            <a:endParaRPr lang="en-US"/>
           </a:p>
         </p:txBody>
       </p:sp>
@@ -648,7 +1349,7 @@
             <a:fld id="{1D8BD707-D9CF-40AE-B4C6-C98DA3205C09}" type="datetimeFigureOut">
               <a:rPr lang="en-US" smtClean="0"/>
               <a:pPr/>
-              <a:t>1/28/2016</a:t>
+              <a:t>9/4/2018</a:t>
             </a:fld>
             <a:endParaRPr lang="en-US"/>
           </a:p>
@@ -738,10 +1439,9 @@
           <a:lstStyle/>
           <a:p>
             <a:r>
-              <a:rPr lang="en-US" smtClean="0"/>
+              <a:rPr lang="en-US"/>
               <a:t>Click to edit Master title style</a:t>
             </a:r>
-            <a:endParaRPr lang="en-US"/>
           </a:p>
         </p:txBody>
       </p:sp>
@@ -762,38 +1462,37 @@
           <a:p>
             <a:pPr lvl="0"/>
             <a:r>
-              <a:rPr lang="en-US" smtClean="0"/>
+              <a:rPr lang="en-US"/>
               <a:t>Click to edit Master text styles</a:t>
             </a:r>
           </a:p>
           <a:p>
             <a:pPr lvl="1"/>
             <a:r>
-              <a:rPr lang="en-US" smtClean="0"/>
+              <a:rPr lang="en-US"/>
               <a:t>Second level</a:t>
             </a:r>
           </a:p>
           <a:p>
             <a:pPr lvl="2"/>
             <a:r>
-              <a:rPr lang="en-US" smtClean="0"/>
+              <a:rPr lang="en-US"/>
               <a:t>Third level</a:t>
             </a:r>
           </a:p>
           <a:p>
             <a:pPr lvl="3"/>
             <a:r>
-              <a:rPr lang="en-US" smtClean="0"/>
+              <a:rPr lang="en-US"/>
               <a:t>Fourth level</a:t>
             </a:r>
           </a:p>
           <a:p>
             <a:pPr lvl="4"/>
             <a:r>
-              <a:rPr lang="en-US" smtClean="0"/>
+              <a:rPr lang="en-US"/>
               <a:t>Fifth level</a:t>
             </a:r>
-            <a:endParaRPr lang="en-US"/>
           </a:p>
         </p:txBody>
       </p:sp>
@@ -815,7 +1514,7 @@
             <a:fld id="{1D8BD707-D9CF-40AE-B4C6-C98DA3205C09}" type="datetimeFigureOut">
               <a:rPr lang="en-US" smtClean="0"/>
               <a:pPr/>
-              <a:t>1/28/2016</a:t>
+              <a:t>9/4/2018</a:t>
             </a:fld>
             <a:endParaRPr lang="en-US"/>
           </a:p>
@@ -914,10 +1613,9 @@
           </a:lstStyle>
           <a:p>
             <a:r>
-              <a:rPr lang="en-US" smtClean="0"/>
+              <a:rPr lang="en-US"/>
               <a:t>Click to edit Master title style</a:t>
             </a:r>
-            <a:endParaRPr lang="en-US"/>
           </a:p>
         </p:txBody>
       </p:sp>
@@ -1034,7 +1732,7 @@
           <a:p>
             <a:pPr lvl="0"/>
             <a:r>
-              <a:rPr lang="en-US" smtClean="0"/>
+              <a:rPr lang="en-US"/>
               <a:t>Click to edit Master text styles</a:t>
             </a:r>
           </a:p>
@@ -1058,7 +1756,7 @@
             <a:fld id="{1D8BD707-D9CF-40AE-B4C6-C98DA3205C09}" type="datetimeFigureOut">
               <a:rPr lang="en-US" smtClean="0"/>
               <a:pPr/>
-              <a:t>1/28/2016</a:t>
+              <a:t>9/4/2018</a:t>
             </a:fld>
             <a:endParaRPr lang="en-US"/>
           </a:p>
@@ -1148,10 +1846,9 @@
           <a:lstStyle/>
           <a:p>
             <a:r>
-              <a:rPr lang="en-US" smtClean="0"/>
+              <a:rPr lang="en-US"/>
               <a:t>Click to edit Master title style</a:t>
             </a:r>
-            <a:endParaRPr lang="en-US"/>
           </a:p>
         </p:txBody>
       </p:sp>
@@ -1205,38 +1902,37 @@
           <a:p>
             <a:pPr lvl="0"/>
             <a:r>
-              <a:rPr lang="en-US" smtClean="0"/>
+              <a:rPr lang="en-US"/>
               <a:t>Click to edit Master text styles</a:t>
             </a:r>
           </a:p>
           <a:p>
             <a:pPr lvl="1"/>
             <a:r>
-              <a:rPr lang="en-US" smtClean="0"/>
+              <a:rPr lang="en-US"/>
               <a:t>Second level</a:t>
             </a:r>
           </a:p>
           <a:p>
             <a:pPr lvl="2"/>
             <a:r>
-              <a:rPr lang="en-US" smtClean="0"/>
+              <a:rPr lang="en-US"/>
               <a:t>Third level</a:t>
             </a:r>
           </a:p>
           <a:p>
             <a:pPr lvl="3"/>
             <a:r>
-              <a:rPr lang="en-US" smtClean="0"/>
+              <a:rPr lang="en-US"/>
               <a:t>Fourth level</a:t>
             </a:r>
           </a:p>
           <a:p>
             <a:pPr lvl="4"/>
             <a:r>
-              <a:rPr lang="en-US" smtClean="0"/>
+              <a:rPr lang="en-US"/>
               <a:t>Fifth level</a:t>
             </a:r>
-            <a:endParaRPr lang="en-US"/>
           </a:p>
         </p:txBody>
       </p:sp>
@@ -1290,38 +1986,37 @@
           <a:p>
             <a:pPr lvl="0"/>
             <a:r>
-              <a:rPr lang="en-US" smtClean="0"/>
+              <a:rPr lang="en-US"/>
               <a:t>Click to edit Master text styles</a:t>
             </a:r>
           </a:p>
           <a:p>
             <a:pPr lvl="1"/>
             <a:r>
-              <a:rPr lang="en-US" smtClean="0"/>
+              <a:rPr lang="en-US"/>
               <a:t>Second level</a:t>
             </a:r>
           </a:p>
           <a:p>
             <a:pPr lvl="2"/>
             <a:r>
-              <a:rPr lang="en-US" smtClean="0"/>
+              <a:rPr lang="en-US"/>
               <a:t>Third level</a:t>
             </a:r>
           </a:p>
           <a:p>
             <a:pPr lvl="3"/>
             <a:r>
-              <a:rPr lang="en-US" smtClean="0"/>
+              <a:rPr lang="en-US"/>
               <a:t>Fourth level</a:t>
             </a:r>
           </a:p>
           <a:p>
             <a:pPr lvl="4"/>
             <a:r>
-              <a:rPr lang="en-US" smtClean="0"/>
+              <a:rPr lang="en-US"/>
               <a:t>Fifth level</a:t>
             </a:r>
-            <a:endParaRPr lang="en-US"/>
           </a:p>
         </p:txBody>
       </p:sp>
@@ -1343,7 +2038,7 @@
             <a:fld id="{1D8BD707-D9CF-40AE-B4C6-C98DA3205C09}" type="datetimeFigureOut">
               <a:rPr lang="en-US" smtClean="0"/>
               <a:pPr/>
-              <a:t>1/28/2016</a:t>
+              <a:t>9/4/2018</a:t>
             </a:fld>
             <a:endParaRPr lang="en-US"/>
           </a:p>
@@ -1437,10 +2132,9 @@
           </a:lstStyle>
           <a:p>
             <a:r>
-              <a:rPr lang="en-US" smtClean="0"/>
+              <a:rPr lang="en-US"/>
               <a:t>Click to edit Master title style</a:t>
             </a:r>
-            <a:endParaRPr lang="en-US"/>
           </a:p>
         </p:txBody>
       </p:sp>
@@ -1503,7 +2197,7 @@
           <a:p>
             <a:pPr lvl="0"/>
             <a:r>
-              <a:rPr lang="en-US" smtClean="0"/>
+              <a:rPr lang="en-US"/>
               <a:t>Click to edit Master text styles</a:t>
             </a:r>
           </a:p>
@@ -1559,38 +2253,37 @@
           <a:p>
             <a:pPr lvl="0"/>
             <a:r>
-              <a:rPr lang="en-US" smtClean="0"/>
+              <a:rPr lang="en-US"/>
               <a:t>Click to edit Master text styles</a:t>
             </a:r>
           </a:p>
           <a:p>
             <a:pPr lvl="1"/>
             <a:r>
-              <a:rPr lang="en-US" smtClean="0"/>
+              <a:rPr lang="en-US"/>
               <a:t>Second level</a:t>
             </a:r>
           </a:p>
           <a:p>
             <a:pPr lvl="2"/>
             <a:r>
-              <a:rPr lang="en-US" smtClean="0"/>
+              <a:rPr lang="en-US"/>
               <a:t>Third level</a:t>
             </a:r>
           </a:p>
           <a:p>
             <a:pPr lvl="3"/>
             <a:r>
-              <a:rPr lang="en-US" smtClean="0"/>
+              <a:rPr lang="en-US"/>
               <a:t>Fourth level</a:t>
             </a:r>
           </a:p>
           <a:p>
             <a:pPr lvl="4"/>
             <a:r>
-              <a:rPr lang="en-US" smtClean="0"/>
+              <a:rPr lang="en-US"/>
               <a:t>Fifth level</a:t>
             </a:r>
-            <a:endParaRPr lang="en-US"/>
           </a:p>
         </p:txBody>
       </p:sp>
@@ -1653,7 +2346,7 @@
           <a:p>
             <a:pPr lvl="0"/>
             <a:r>
-              <a:rPr lang="en-US" smtClean="0"/>
+              <a:rPr lang="en-US"/>
               <a:t>Click to edit Master text styles</a:t>
             </a:r>
           </a:p>
@@ -1709,38 +2402,37 @@
           <a:p>
             <a:pPr lvl="0"/>
             <a:r>
-              <a:rPr lang="en-US" smtClean="0"/>
+              <a:rPr lang="en-US"/>
               <a:t>Click to edit Master text styles</a:t>
             </a:r>
           </a:p>
           <a:p>
             <a:pPr lvl="1"/>
             <a:r>
-              <a:rPr lang="en-US" smtClean="0"/>
+              <a:rPr lang="en-US"/>
               <a:t>Second level</a:t>
             </a:r>
           </a:p>
           <a:p>
             <a:pPr lvl="2"/>
             <a:r>
-              <a:rPr lang="en-US" smtClean="0"/>
+              <a:rPr lang="en-US"/>
               <a:t>Third level</a:t>
             </a:r>
           </a:p>
           <a:p>
             <a:pPr lvl="3"/>
             <a:r>
-              <a:rPr lang="en-US" smtClean="0"/>
+              <a:rPr lang="en-US"/>
               <a:t>Fourth level</a:t>
             </a:r>
           </a:p>
           <a:p>
             <a:pPr lvl="4"/>
             <a:r>
-              <a:rPr lang="en-US" smtClean="0"/>
+              <a:rPr lang="en-US"/>
               <a:t>Fifth level</a:t>
             </a:r>
-            <a:endParaRPr lang="en-US"/>
           </a:p>
         </p:txBody>
       </p:sp>
@@ -1762,7 +2454,7 @@
             <a:fld id="{1D8BD707-D9CF-40AE-B4C6-C98DA3205C09}" type="datetimeFigureOut">
               <a:rPr lang="en-US" smtClean="0"/>
               <a:pPr/>
-              <a:t>1/28/2016</a:t>
+              <a:t>9/4/2018</a:t>
             </a:fld>
             <a:endParaRPr lang="en-US"/>
           </a:p>
@@ -1852,10 +2544,9 @@
           <a:lstStyle/>
           <a:p>
             <a:r>
-              <a:rPr lang="en-US" smtClean="0"/>
+              <a:rPr lang="en-US"/>
               <a:t>Click to edit Master title style</a:t>
             </a:r>
-            <a:endParaRPr lang="en-US"/>
           </a:p>
         </p:txBody>
       </p:sp>
@@ -1877,7 +2568,7 @@
             <a:fld id="{1D8BD707-D9CF-40AE-B4C6-C98DA3205C09}" type="datetimeFigureOut">
               <a:rPr lang="en-US" smtClean="0"/>
               <a:pPr/>
-              <a:t>1/28/2016</a:t>
+              <a:t>9/4/2018</a:t>
             </a:fld>
             <a:endParaRPr lang="en-US"/>
           </a:p>
@@ -1969,7 +2660,7 @@
             <a:fld id="{1D8BD707-D9CF-40AE-B4C6-C98DA3205C09}" type="datetimeFigureOut">
               <a:rPr lang="en-US" smtClean="0"/>
               <a:pPr/>
-              <a:t>1/28/2016</a:t>
+              <a:t>9/4/2018</a:t>
             </a:fld>
             <a:endParaRPr lang="en-US"/>
           </a:p>
@@ -2068,10 +2759,9 @@
           </a:lstStyle>
           <a:p>
             <a:r>
-              <a:rPr lang="en-US" smtClean="0"/>
+              <a:rPr lang="en-US"/>
               <a:t>Click to edit Master title style</a:t>
             </a:r>
-            <a:endParaRPr lang="en-US"/>
           </a:p>
         </p:txBody>
       </p:sp>
@@ -2125,38 +2815,37 @@
           <a:p>
             <a:pPr lvl="0"/>
             <a:r>
-              <a:rPr lang="en-US" smtClean="0"/>
+              <a:rPr lang="en-US"/>
               <a:t>Click to edit Master text styles</a:t>
             </a:r>
           </a:p>
           <a:p>
             <a:pPr lvl="1"/>
             <a:r>
-              <a:rPr lang="en-US" smtClean="0"/>
+              <a:rPr lang="en-US"/>
               <a:t>Second level</a:t>
             </a:r>
           </a:p>
           <a:p>
             <a:pPr lvl="2"/>
             <a:r>
-              <a:rPr lang="en-US" smtClean="0"/>
+              <a:rPr lang="en-US"/>
               <a:t>Third level</a:t>
             </a:r>
           </a:p>
           <a:p>
             <a:pPr lvl="3"/>
             <a:r>
-              <a:rPr lang="en-US" smtClean="0"/>
+              <a:rPr lang="en-US"/>
               <a:t>Fourth level</a:t>
             </a:r>
           </a:p>
           <a:p>
             <a:pPr lvl="4"/>
             <a:r>
-              <a:rPr lang="en-US" smtClean="0"/>
+              <a:rPr lang="en-US"/>
               <a:t>Fifth level</a:t>
             </a:r>
-            <a:endParaRPr lang="en-US"/>
           </a:p>
         </p:txBody>
       </p:sp>
@@ -2219,7 +2908,7 @@
           <a:p>
             <a:pPr lvl="0"/>
             <a:r>
-              <a:rPr lang="en-US" smtClean="0"/>
+              <a:rPr lang="en-US"/>
               <a:t>Click to edit Master text styles</a:t>
             </a:r>
           </a:p>
@@ -2243,7 +2932,7 @@
             <a:fld id="{1D8BD707-D9CF-40AE-B4C6-C98DA3205C09}" type="datetimeFigureOut">
               <a:rPr lang="en-US" smtClean="0"/>
               <a:pPr/>
-              <a:t>1/28/2016</a:t>
+              <a:t>9/4/2018</a:t>
             </a:fld>
             <a:endParaRPr lang="en-US"/>
           </a:p>
@@ -2342,10 +3031,9 @@
           </a:lstStyle>
           <a:p>
             <a:r>
-              <a:rPr lang="en-US" smtClean="0"/>
+              <a:rPr lang="en-US"/>
               <a:t>Click to edit Master title style</a:t>
             </a:r>
-            <a:endParaRPr lang="en-US"/>
           </a:p>
         </p:txBody>
       </p:sp>
@@ -2469,7 +3157,7 @@
           <a:p>
             <a:pPr lvl="0"/>
             <a:r>
-              <a:rPr lang="en-US" smtClean="0"/>
+              <a:rPr lang="en-US"/>
               <a:t>Click to edit Master text styles</a:t>
             </a:r>
           </a:p>
@@ -2493,7 +3181,7 @@
             <a:fld id="{1D8BD707-D9CF-40AE-B4C6-C98DA3205C09}" type="datetimeFigureOut">
               <a:rPr lang="en-US" smtClean="0"/>
               <a:pPr/>
-              <a:t>1/28/2016</a:t>
+              <a:t>9/4/2018</a:t>
             </a:fld>
             <a:endParaRPr lang="en-US"/>
           </a:p>
@@ -2598,10 +3286,9 @@
           <a:lstStyle/>
           <a:p>
             <a:r>
-              <a:rPr lang="en-US" smtClean="0"/>
+              <a:rPr lang="en-US"/>
               <a:t>Click to edit Master title style</a:t>
             </a:r>
-            <a:endParaRPr lang="en-US"/>
           </a:p>
         </p:txBody>
       </p:sp>
@@ -2632,38 +3319,37 @@
           <a:p>
             <a:pPr lvl="0"/>
             <a:r>
-              <a:rPr lang="en-US" smtClean="0"/>
+              <a:rPr lang="en-US"/>
               <a:t>Click to edit Master text styles</a:t>
             </a:r>
           </a:p>
           <a:p>
             <a:pPr lvl="1"/>
             <a:r>
-              <a:rPr lang="en-US" smtClean="0"/>
+              <a:rPr lang="en-US"/>
               <a:t>Second level</a:t>
             </a:r>
           </a:p>
           <a:p>
             <a:pPr lvl="2"/>
             <a:r>
-              <a:rPr lang="en-US" smtClean="0"/>
+              <a:rPr lang="en-US"/>
               <a:t>Third level</a:t>
             </a:r>
           </a:p>
           <a:p>
             <a:pPr lvl="3"/>
             <a:r>
-              <a:rPr lang="en-US" smtClean="0"/>
+              <a:rPr lang="en-US"/>
               <a:t>Fourth level</a:t>
             </a:r>
           </a:p>
           <a:p>
             <a:pPr lvl="4"/>
             <a:r>
-              <a:rPr lang="en-US" smtClean="0"/>
+              <a:rPr lang="en-US"/>
               <a:t>Fifth level</a:t>
             </a:r>
-            <a:endParaRPr lang="en-US"/>
           </a:p>
         </p:txBody>
       </p:sp>
@@ -2703,7 +3389,7 @@
             <a:fld id="{1D8BD707-D9CF-40AE-B4C6-C98DA3205C09}" type="datetimeFigureOut">
               <a:rPr lang="en-US" smtClean="0"/>
               <a:pPr/>
-              <a:t>1/28/2016</a:t>
+              <a:t>9/4/2018</a:t>
             </a:fld>
             <a:endParaRPr lang="en-US"/>
           </a:p>
@@ -3090,14 +3776,9 @@
           <a:lstStyle/>
           <a:p>
             <a:r>
-              <a:rPr lang="en-US" dirty="0" err="1" smtClean="0"/>
-              <a:t>Tuto</a:t>
-            </a:r>
-            <a:r>
-              <a:rPr lang="en-US" dirty="0" smtClean="0"/>
-              <a:t> Unity3D</a:t>
-            </a:r>
-            <a:endParaRPr lang="en-US" dirty="0"/>
+              <a:rPr lang="en-US" dirty="0"/>
+              <a:t>Unity3D Formation</a:t>
+            </a:r>
           </a:p>
         </p:txBody>
       </p:sp>
@@ -3111,13 +3792,6 @@
   <p:clrMapOvr>
     <a:masterClrMapping/>
   </p:clrMapOvr>
-  <p:timing>
-    <p:tnLst>
-      <p:par>
-        <p:cTn id="1" dur="indefinite" restart="never" nodeType="tmRoot"/>
-      </p:par>
-    </p:tnLst>
-  </p:timing>
 </p:sld>
 </file>
 
@@ -3154,14 +3828,9 @@
           <a:lstStyle/>
           <a:p>
             <a:r>
-              <a:rPr lang="en-US" dirty="0" smtClean="0"/>
-              <a:t>Unity3D &amp; </a:t>
-            </a:r>
-            <a:r>
-              <a:rPr lang="en-US" dirty="0" err="1" smtClean="0"/>
-              <a:t>Git</a:t>
-            </a:r>
-            <a:endParaRPr lang="en-US" dirty="0"/>
+              <a:rPr lang="en-US" dirty="0"/>
+              <a:t>8. Lighting</a:t>
+            </a:r>
           </a:p>
         </p:txBody>
       </p:sp>
@@ -3175,15 +3844,10 @@
             <p:ph idx="1"/>
           </p:nvPr>
         </p:nvSpPr>
-        <p:spPr>
-          <a:xfrm>
-            <a:off x="457200" y="1600200"/>
-            <a:ext cx="8458200" cy="5029200"/>
-          </a:xfrm>
-        </p:spPr>
+        <p:spPr/>
         <p:txBody>
           <a:bodyPr>
-            <a:normAutofit lnSpcReduction="10000"/>
+            <a:normAutofit fontScale="92500" lnSpcReduction="10000"/>
           </a:bodyPr>
           <a:lstStyle/>
           <a:p>
@@ -3191,138 +3855,80 @@
               <a:buAutoNum type="arabicParenR"/>
             </a:pPr>
             <a:r>
-              <a:rPr lang="en-US" dirty="0" smtClean="0"/>
-              <a:t>You should use </a:t>
-            </a:r>
-            <a:r>
-              <a:rPr lang="en-US" dirty="0" err="1" smtClean="0"/>
-              <a:t>Git</a:t>
-            </a:r>
-            <a:r>
-              <a:rPr lang="en-US" dirty="0"/>
-              <a:t> </a:t>
-            </a:r>
-            <a:r>
-              <a:rPr lang="en-US" dirty="0" smtClean="0"/>
-              <a:t>with Unity3D </a:t>
-            </a:r>
-            <a:r>
-              <a:rPr lang="en-US" dirty="0" smtClean="0"/>
-              <a:t>!</a:t>
-            </a:r>
-            <a:endParaRPr lang="en-US" dirty="0" smtClean="0"/>
-          </a:p>
-          <a:p>
-            <a:pPr marL="514350" indent="-514350">
-              <a:buAutoNum type="arabicParenR"/>
+              <a:rPr lang="en-US" dirty="0"/>
+              <a:t>Setup your static environment: all the non-moving object should be set to static !</a:t>
+            </a:r>
+          </a:p>
+          <a:p>
+            <a:pPr marL="0" indent="0">
+              <a:buNone/>
             </a:pPr>
-            <a:r>
-              <a:rPr lang="en-US" dirty="0" smtClean="0"/>
-              <a:t>Edit &gt; Settings &gt; Editor : Visible Meta Files</a:t>
-            </a:r>
+            <a:endParaRPr lang="en-US" dirty="0"/>
           </a:p>
           <a:p>
             <a:pPr marL="0" indent="0">
               <a:buNone/>
             </a:pPr>
             <a:r>
-              <a:rPr lang="en-US" dirty="0" smtClean="0"/>
-              <a:t>Meta files contain </a:t>
-            </a:r>
-            <a:r>
-              <a:rPr lang="en-US" dirty="0" err="1" smtClean="0"/>
-              <a:t>informations</a:t>
-            </a:r>
-            <a:r>
-              <a:rPr lang="en-US" dirty="0" smtClean="0"/>
-              <a:t> that need to be shared between developers !</a:t>
+              <a:rPr lang="en-US" dirty="0"/>
+              <a:t>2) Setup your lights in the scene: place your Sun, your </a:t>
+            </a:r>
+            <a:r>
+              <a:rPr lang="en-US" dirty="0" err="1"/>
+              <a:t>realtime</a:t>
+            </a:r>
+            <a:r>
+              <a:rPr lang="en-US" dirty="0"/>
+              <a:t> lights, </a:t>
+            </a:r>
+            <a:r>
+              <a:rPr lang="en-US" dirty="0" err="1"/>
+              <a:t>etc</a:t>
+            </a:r>
+            <a:r>
+              <a:rPr lang="en-US" dirty="0"/>
+              <a:t>…</a:t>
+            </a:r>
+          </a:p>
+          <a:p>
+            <a:r>
+              <a:rPr lang="en-US" dirty="0"/>
+              <a:t>STATIC LIGHTS SHOULD BE BAKED !</a:t>
             </a:r>
           </a:p>
           <a:p>
             <a:pPr marL="0" indent="0">
               <a:buNone/>
             </a:pPr>
-            <a:r>
-              <a:rPr lang="en-US" dirty="0" smtClean="0"/>
-              <a:t>3) Only Commit Assets &amp; </a:t>
-            </a:r>
-            <a:r>
-              <a:rPr lang="en-US" dirty="0" err="1" smtClean="0"/>
-              <a:t>ProjectSettings</a:t>
-            </a:r>
-            <a:r>
-              <a:rPr lang="en-US" dirty="0" smtClean="0"/>
-              <a:t> </a:t>
-            </a:r>
-            <a:r>
-              <a:rPr lang="en-US" dirty="0" err="1" smtClean="0"/>
-              <a:t>dirs</a:t>
-            </a:r>
-            <a:endParaRPr lang="en-US" dirty="0" smtClean="0"/>
+            <a:endParaRPr lang="en-US" dirty="0"/>
           </a:p>
           <a:p>
             <a:pPr marL="0" indent="0">
               <a:buNone/>
             </a:pPr>
             <a:r>
-              <a:rPr lang="en-US" dirty="0" smtClean="0"/>
-              <a:t>(.</a:t>
-            </a:r>
-            <a:r>
-              <a:rPr lang="en-US" dirty="0" err="1" smtClean="0"/>
-              <a:t>gitignore</a:t>
-            </a:r>
-            <a:r>
-              <a:rPr lang="en-US" dirty="0" smtClean="0"/>
-              <a:t> file)</a:t>
-            </a:r>
-          </a:p>
-          <a:p>
-            <a:pPr marL="0" indent="0">
-              <a:buNone/>
-            </a:pPr>
-            <a:r>
-              <a:rPr lang="en-US" dirty="0" smtClean="0"/>
-              <a:t>4) Remove operations only in </a:t>
-            </a:r>
-            <a:r>
-              <a:rPr lang="en-US" dirty="0" err="1" smtClean="0"/>
-              <a:t>UnityEditor</a:t>
-            </a:r>
-            <a:r>
-              <a:rPr lang="en-US" dirty="0" smtClean="0"/>
-              <a:t> !</a:t>
-            </a:r>
-          </a:p>
-          <a:p>
-            <a:pPr marL="0" indent="0">
-              <a:buNone/>
-            </a:pPr>
-            <a:r>
-              <a:rPr lang="en-US" dirty="0" smtClean="0"/>
-              <a:t>5) Always Add before Commit : Unity can generate files (meta files especially)</a:t>
-            </a:r>
-            <a:endParaRPr lang="en-US" dirty="0"/>
+              <a:rPr lang="en-US" dirty="0"/>
+              <a:t>3) Unity GI: Lightning can bounce on surfaces</a:t>
+            </a:r>
+          </a:p>
+          <a:p>
+            <a:r>
+              <a:rPr lang="en-US" dirty="0"/>
+              <a:t>YOU CAN SPEND YOUR LIFE TUNING LIGHTS !</a:t>
+            </a:r>
           </a:p>
         </p:txBody>
       </p:sp>
     </p:spTree>
     <p:extLst>
       <p:ext uri="{BB962C8B-B14F-4D97-AF65-F5344CB8AC3E}">
-        <p14:creationId xmlns:p14="http://schemas.microsoft.com/office/powerpoint/2010/main" val="3721495045"/>
+        <p14:creationId xmlns:p14="http://schemas.microsoft.com/office/powerpoint/2010/main" val="1704323172"/>
       </p:ext>
     </p:extLst>
   </p:cSld>
   <p:clrMapOvr>
     <a:masterClrMapping/>
   </p:clrMapOvr>
-  <p:timing>
-    <p:tnLst>
-      <p:par>
-        <p:cTn id="1" dur="indefinite" restart="never" nodeType="tmRoot"/>
-      </p:par>
-    </p:tnLst>
-  </p:timing>
 </p:sld>
 </file>
 
@@ -3359,10 +3965,9 @@
           <a:lstStyle/>
           <a:p>
             <a:r>
-              <a:rPr lang="en-US" dirty="0" smtClean="0"/>
-              <a:t>Package VR</a:t>
-            </a:r>
-            <a:endParaRPr lang="en-US" dirty="0"/>
+              <a:rPr lang="en-US" dirty="0"/>
+              <a:t>9. Unity3D &amp; Git</a:t>
+            </a:r>
           </a:p>
         </p:txBody>
       </p:sp>
@@ -3379,996 +3984,134 @@
         <p:spPr>
           <a:xfrm>
             <a:off x="457200" y="1600200"/>
-            <a:ext cx="8229600" cy="4876800"/>
+            <a:ext cx="8458200" cy="5029200"/>
           </a:xfrm>
         </p:spPr>
         <p:txBody>
           <a:bodyPr>
-            <a:normAutofit fontScale="92500"/>
+            <a:normAutofit lnSpcReduction="10000"/>
           </a:bodyPr>
           <a:lstStyle/>
-          <a:p>
-            <a:r>
-              <a:rPr lang="en-US" dirty="0" smtClean="0"/>
-              <a:t>A Camera is Free in rotations, a </a:t>
-            </a:r>
-            <a:r>
-              <a:rPr lang="en-US" dirty="0" err="1" smtClean="0"/>
-              <a:t>VRCamera</a:t>
-            </a:r>
-            <a:r>
-              <a:rPr lang="en-US" dirty="0" smtClean="0"/>
-              <a:t> is not !</a:t>
-            </a:r>
-          </a:p>
           <a:p>
             <a:pPr marL="514350" indent="-514350">
               <a:buAutoNum type="arabicParenR"/>
             </a:pPr>
             <a:r>
-              <a:rPr lang="en-US" dirty="0" smtClean="0"/>
-              <a:t>Setup your </a:t>
-            </a:r>
-            <a:r>
-              <a:rPr lang="en-US" dirty="0" err="1" smtClean="0"/>
-              <a:t>VRScreens</a:t>
-            </a:r>
-            <a:r>
-              <a:rPr lang="en-US" dirty="0" smtClean="0"/>
-              <a:t> (</a:t>
-            </a:r>
-            <a:r>
-              <a:rPr lang="en-US" dirty="0" err="1" smtClean="0"/>
-              <a:t>e.g</a:t>
-            </a:r>
-            <a:r>
-              <a:rPr lang="en-US" dirty="0" smtClean="0"/>
-              <a:t> Projection Surfaces or Physical Screens)</a:t>
+              <a:rPr lang="en-US" dirty="0"/>
+              <a:t>You should use </a:t>
+            </a:r>
+            <a:r>
+              <a:rPr lang="en-US" dirty="0" err="1"/>
+              <a:t>Git</a:t>
+            </a:r>
+            <a:r>
+              <a:rPr lang="en-US" dirty="0"/>
+              <a:t> with Unity3D !</a:t>
             </a:r>
           </a:p>
           <a:p>
             <a:pPr marL="514350" indent="-514350">
               <a:buAutoNum type="arabicParenR"/>
             </a:pPr>
-            <a:endParaRPr lang="en-US" dirty="0" smtClean="0"/>
-          </a:p>
-          <a:p>
-            <a:pPr marL="514350" indent="-514350">
-              <a:buAutoNum type="arabicParenR"/>
+            <a:r>
+              <a:rPr lang="en-US" dirty="0"/>
+              <a:t>Edit &gt; Settings &gt; Editor : Visible Meta Files</a:t>
+            </a:r>
+          </a:p>
+          <a:p>
+            <a:pPr marL="0" indent="0">
+              <a:buNone/>
             </a:pPr>
             <a:r>
-              <a:rPr lang="en-US" dirty="0" smtClean="0"/>
-              <a:t>Attach as many </a:t>
-            </a:r>
-            <a:r>
-              <a:rPr lang="en-US" dirty="0" err="1" smtClean="0"/>
-              <a:t>VRCamera</a:t>
-            </a:r>
-            <a:r>
-              <a:rPr lang="en-US" dirty="0" smtClean="0"/>
-              <a:t> to your </a:t>
-            </a:r>
-            <a:r>
-              <a:rPr lang="en-US" dirty="0" err="1" smtClean="0"/>
-              <a:t>VRScreens</a:t>
-            </a:r>
-            <a:endParaRPr lang="en-US" dirty="0" smtClean="0"/>
-          </a:p>
-          <a:p>
-            <a:pPr marL="514350" indent="-514350">
-              <a:buAutoNum type="arabicParenR"/>
+              <a:rPr lang="en-US" dirty="0"/>
+              <a:t>Meta files contain </a:t>
+            </a:r>
+            <a:r>
+              <a:rPr lang="en-US" dirty="0" err="1"/>
+              <a:t>informations</a:t>
+            </a:r>
+            <a:r>
+              <a:rPr lang="en-US" dirty="0"/>
+              <a:t> that need to be shared between developers !</a:t>
+            </a:r>
+          </a:p>
+          <a:p>
+            <a:pPr marL="0" indent="0">
+              <a:buNone/>
             </a:pPr>
-            <a:endParaRPr lang="en-US" dirty="0" smtClean="0"/>
-          </a:p>
-          <a:p>
-            <a:pPr marL="514350" indent="-514350">
-              <a:buAutoNum type="arabicParenR"/>
+            <a:r>
+              <a:rPr lang="en-US" dirty="0"/>
+              <a:t>3) Only Commit Assets &amp; </a:t>
+            </a:r>
+            <a:r>
+              <a:rPr lang="en-US" dirty="0" err="1"/>
+              <a:t>ProjectSettings</a:t>
+            </a:r>
+            <a:r>
+              <a:rPr lang="en-US" dirty="0"/>
+              <a:t> </a:t>
+            </a:r>
+            <a:r>
+              <a:rPr lang="en-US" dirty="0" err="1"/>
+              <a:t>dirs</a:t>
+            </a:r>
+            <a:endParaRPr lang="en-US" dirty="0"/>
+          </a:p>
+          <a:p>
+            <a:pPr marL="0" indent="0">
+              <a:buNone/>
             </a:pPr>
             <a:r>
-              <a:rPr lang="en-US" dirty="0" smtClean="0"/>
-              <a:t>Let’s Head Tracker + Stereoscopy do the magic !</a:t>
-            </a:r>
-          </a:p>
-          <a:p>
-            <a:pPr marL="514350" indent="-514350">
-              <a:buAutoNum type="arabicParenR"/>
+              <a:rPr lang="en-US" dirty="0"/>
+              <a:t>(.</a:t>
+            </a:r>
+            <a:r>
+              <a:rPr lang="en-US" dirty="0" err="1"/>
+              <a:t>gitignore</a:t>
+            </a:r>
+            <a:r>
+              <a:rPr lang="en-US" dirty="0"/>
+              <a:t> file)</a:t>
+            </a:r>
+          </a:p>
+          <a:p>
+            <a:pPr marL="0" indent="0">
+              <a:buNone/>
             </a:pPr>
-            <a:endParaRPr lang="en-US" dirty="0" smtClean="0"/>
-          </a:p>
-          <a:p>
-            <a:r>
-              <a:rPr lang="en-US" dirty="0" smtClean="0"/>
-              <a:t>Unity3D now supports 8 screens natively</a:t>
-            </a:r>
-          </a:p>
-          <a:p>
-            <a:pPr marL="514350" indent="-514350">
-              <a:buAutoNum type="arabicParenR"/>
+            <a:r>
+              <a:rPr lang="en-US" dirty="0"/>
+              <a:t>4) Remove operations only in </a:t>
+            </a:r>
+            <a:r>
+              <a:rPr lang="en-US" dirty="0" err="1"/>
+              <a:t>UnityEditor</a:t>
+            </a:r>
+            <a:r>
+              <a:rPr lang="en-US" dirty="0"/>
+              <a:t> !</a:t>
+            </a:r>
+          </a:p>
+          <a:p>
+            <a:pPr marL="0" indent="0">
+              <a:buNone/>
             </a:pPr>
-            <a:endParaRPr lang="en-US" dirty="0" smtClean="0"/>
+            <a:r>
+              <a:rPr lang="en-US" dirty="0"/>
+              <a:t>5) Always Add before Commit : Unity can generate files (meta files especially)</a:t>
+            </a:r>
           </a:p>
         </p:txBody>
       </p:sp>
     </p:spTree>
     <p:extLst>
       <p:ext uri="{BB962C8B-B14F-4D97-AF65-F5344CB8AC3E}">
-        <p14:creationId xmlns:p14="http://schemas.microsoft.com/office/powerpoint/2010/main" val="2854600397"/>
+        <p14:creationId xmlns:p14="http://schemas.microsoft.com/office/powerpoint/2010/main" val="3721495045"/>
       </p:ext>
     </p:extLst>
   </p:cSld>
   <p:clrMapOvr>
     <a:masterClrMapping/>
   </p:clrMapOvr>
-  <p:timing>
-    <p:tnLst>
-      <p:par>
-        <p:cTn id="1" dur="indefinite" restart="never" nodeType="tmRoot"/>
-      </p:par>
-    </p:tnLst>
-  </p:timing>
-</p:sld>
-</file>
-
-<file path=ppt/slides/slide12.xml><?xml version="1.0" encoding="utf-8"?>
-<p:sld xmlns:a="http://schemas.openxmlformats.org/drawingml/2006/main" xmlns:r="http://schemas.openxmlformats.org/officeDocument/2006/relationships" xmlns:p="http://schemas.openxmlformats.org/presentationml/2006/main">
-  <p:cSld>
-    <p:spTree>
-      <p:nvGrpSpPr>
-        <p:cNvPr id="1" name=""/>
-        <p:cNvGrpSpPr/>
-        <p:nvPr/>
-      </p:nvGrpSpPr>
-      <p:grpSpPr>
-        <a:xfrm>
-          <a:off x="0" y="0"/>
-          <a:ext cx="0" cy="0"/>
-          <a:chOff x="0" y="0"/>
-          <a:chExt cx="0" cy="0"/>
-        </a:xfrm>
-      </p:grpSpPr>
-      <p:sp>
-        <p:nvSpPr>
-          <p:cNvPr id="2" name="Titre 1"/>
-          <p:cNvSpPr>
-            <a:spLocks noGrp="1"/>
-          </p:cNvSpPr>
-          <p:nvPr>
-            <p:ph type="title"/>
-          </p:nvPr>
-        </p:nvSpPr>
-        <p:spPr/>
-        <p:txBody>
-          <a:bodyPr/>
-          <a:lstStyle/>
-          <a:p>
-            <a:r>
-              <a:rPr lang="en-US" dirty="0" err="1" smtClean="0"/>
-              <a:t>Optitrack</a:t>
-            </a:r>
-            <a:r>
-              <a:rPr lang="en-US" dirty="0" smtClean="0"/>
-              <a:t> Client</a:t>
-            </a:r>
-            <a:endParaRPr lang="en-US" dirty="0"/>
-          </a:p>
-        </p:txBody>
-      </p:sp>
-      <p:sp>
-        <p:nvSpPr>
-          <p:cNvPr id="3" name="Espace réservé du contenu 2"/>
-          <p:cNvSpPr>
-            <a:spLocks noGrp="1"/>
-          </p:cNvSpPr>
-          <p:nvPr>
-            <p:ph idx="1"/>
-          </p:nvPr>
-        </p:nvSpPr>
-        <p:spPr/>
-        <p:txBody>
-          <a:bodyPr>
-            <a:normAutofit fontScale="92500" lnSpcReduction="10000"/>
-          </a:bodyPr>
-          <a:lstStyle/>
-          <a:p>
-            <a:r>
-              <a:rPr lang="en-US" dirty="0" smtClean="0"/>
-              <a:t>MotiveUnityServer.exe: listen Motive data and send data to Clients</a:t>
-            </a:r>
-          </a:p>
-          <a:p>
-            <a:r>
-              <a:rPr lang="en-US" dirty="0" err="1" smtClean="0"/>
-              <a:t>MotiveUnityClient</a:t>
-            </a:r>
-            <a:r>
-              <a:rPr lang="en-US" dirty="0" smtClean="0"/>
-              <a:t>: A package to get data from </a:t>
-            </a:r>
-            <a:r>
-              <a:rPr lang="en-US" dirty="0" err="1" smtClean="0"/>
-              <a:t>MotiveUnityServer</a:t>
-            </a:r>
-            <a:r>
-              <a:rPr lang="en-US" dirty="0"/>
-              <a:t> </a:t>
-            </a:r>
-            <a:r>
-              <a:rPr lang="en-US" dirty="0" smtClean="0"/>
-              <a:t>in Unity3D.</a:t>
-            </a:r>
-          </a:p>
-          <a:p>
-            <a:pPr marL="0" indent="0">
-              <a:buNone/>
-            </a:pPr>
-            <a:endParaRPr lang="en-US" dirty="0"/>
-          </a:p>
-          <a:p>
-            <a:pPr marL="514350" indent="-514350">
-              <a:buAutoNum type="arabicParenR"/>
-            </a:pPr>
-            <a:r>
-              <a:rPr lang="en-US" dirty="0" smtClean="0"/>
-              <a:t>Configure your Streaming with Motive</a:t>
-            </a:r>
-          </a:p>
-          <a:p>
-            <a:pPr marL="514350" indent="-514350">
-              <a:buAutoNum type="arabicParenR"/>
-            </a:pPr>
-            <a:r>
-              <a:rPr lang="en-US" dirty="0" smtClean="0"/>
-              <a:t>Launch </a:t>
-            </a:r>
-            <a:r>
-              <a:rPr lang="en-US" dirty="0" err="1" smtClean="0"/>
-              <a:t>MotiveUnityServer</a:t>
-            </a:r>
-            <a:r>
-              <a:rPr lang="en-US" dirty="0" smtClean="0"/>
-              <a:t> on the </a:t>
-            </a:r>
-            <a:r>
-              <a:rPr lang="en-US" dirty="0" err="1" smtClean="0"/>
-              <a:t>Optitrack</a:t>
-            </a:r>
-            <a:r>
-              <a:rPr lang="en-US" dirty="0" smtClean="0"/>
-              <a:t> computer (IP </a:t>
-            </a:r>
-            <a:r>
-              <a:rPr lang="en-US" dirty="0" err="1" smtClean="0"/>
-              <a:t>Adress</a:t>
-            </a:r>
-            <a:r>
-              <a:rPr lang="en-US" dirty="0" smtClean="0"/>
-              <a:t> of clients must be set)</a:t>
-            </a:r>
-          </a:p>
-          <a:p>
-            <a:pPr marL="514350" indent="-514350">
-              <a:buAutoNum type="arabicParenR"/>
-            </a:pPr>
-            <a:r>
-              <a:rPr lang="en-US" dirty="0" smtClean="0"/>
-              <a:t>Launch the client in Unity</a:t>
-            </a:r>
-          </a:p>
-          <a:p>
-            <a:endParaRPr lang="en-US" dirty="0"/>
-          </a:p>
-        </p:txBody>
-      </p:sp>
-    </p:spTree>
-    <p:extLst>
-      <p:ext uri="{BB962C8B-B14F-4D97-AF65-F5344CB8AC3E}">
-        <p14:creationId xmlns:p14="http://schemas.microsoft.com/office/powerpoint/2010/main" val="3230451176"/>
-      </p:ext>
-    </p:extLst>
-  </p:cSld>
-  <p:clrMapOvr>
-    <a:masterClrMapping/>
-  </p:clrMapOvr>
-  <p:timing>
-    <p:tnLst>
-      <p:par>
-        <p:cTn id="1" dur="indefinite" restart="never" nodeType="tmRoot"/>
-      </p:par>
-    </p:tnLst>
-  </p:timing>
-</p:sld>
-</file>
-
-<file path=ppt/slides/slide13.xml><?xml version="1.0" encoding="utf-8"?>
-<p:sld xmlns:a="http://schemas.openxmlformats.org/drawingml/2006/main" xmlns:r="http://schemas.openxmlformats.org/officeDocument/2006/relationships" xmlns:p="http://schemas.openxmlformats.org/presentationml/2006/main">
-  <p:cSld>
-    <p:spTree>
-      <p:nvGrpSpPr>
-        <p:cNvPr id="1" name=""/>
-        <p:cNvGrpSpPr/>
-        <p:nvPr/>
-      </p:nvGrpSpPr>
-      <p:grpSpPr>
-        <a:xfrm>
-          <a:off x="0" y="0"/>
-          <a:ext cx="0" cy="0"/>
-          <a:chOff x="0" y="0"/>
-          <a:chExt cx="0" cy="0"/>
-        </a:xfrm>
-      </p:grpSpPr>
-      <p:sp>
-        <p:nvSpPr>
-          <p:cNvPr id="2" name="Titre 1"/>
-          <p:cNvSpPr>
-            <a:spLocks noGrp="1"/>
-          </p:cNvSpPr>
-          <p:nvPr>
-            <p:ph type="title"/>
-          </p:nvPr>
-        </p:nvSpPr>
-        <p:spPr/>
-        <p:txBody>
-          <a:bodyPr>
-            <a:normAutofit fontScale="90000"/>
-          </a:bodyPr>
-          <a:lstStyle/>
-          <a:p>
-            <a:r>
-              <a:rPr lang="en-US" dirty="0" smtClean="0"/>
-              <a:t>VR: How to match </a:t>
-            </a:r>
-            <a:br>
-              <a:rPr lang="en-US" dirty="0" smtClean="0"/>
-            </a:br>
-            <a:r>
-              <a:rPr lang="en-US" dirty="0" smtClean="0"/>
-              <a:t>Real &amp; Virtual Spaces ?</a:t>
-            </a:r>
-            <a:endParaRPr lang="en-US" dirty="0"/>
-          </a:p>
-        </p:txBody>
-      </p:sp>
-      <p:sp>
-        <p:nvSpPr>
-          <p:cNvPr id="3" name="Espace réservé du contenu 2"/>
-          <p:cNvSpPr>
-            <a:spLocks noGrp="1"/>
-          </p:cNvSpPr>
-          <p:nvPr>
-            <p:ph idx="1"/>
-          </p:nvPr>
-        </p:nvSpPr>
-        <p:spPr/>
-        <p:txBody>
-          <a:bodyPr>
-            <a:normAutofit lnSpcReduction="10000"/>
-          </a:bodyPr>
-          <a:lstStyle/>
-          <a:p>
-            <a:r>
-              <a:rPr lang="en-US" dirty="0" smtClean="0"/>
-              <a:t>Use case: </a:t>
-            </a:r>
-            <a:r>
-              <a:rPr lang="en-US" dirty="0" err="1" smtClean="0"/>
-              <a:t>MocapGridGame</a:t>
-            </a:r>
-            <a:endParaRPr lang="en-US" dirty="0" smtClean="0"/>
-          </a:p>
-          <a:p>
-            <a:pPr>
-              <a:buFontTx/>
-              <a:buChar char="-"/>
-            </a:pPr>
-            <a:r>
-              <a:rPr lang="en-US" dirty="0" smtClean="0"/>
-              <a:t>Center of Game area is a good candidate to put both </a:t>
-            </a:r>
-            <a:r>
-              <a:rPr lang="en-US" dirty="0" err="1" smtClean="0"/>
-              <a:t>Optitrack</a:t>
-            </a:r>
-            <a:r>
-              <a:rPr lang="en-US" dirty="0" smtClean="0"/>
-              <a:t> &amp; Unity Reference frames !</a:t>
-            </a:r>
-          </a:p>
-          <a:p>
-            <a:pPr>
-              <a:buFontTx/>
-              <a:buChar char="-"/>
-            </a:pPr>
-            <a:r>
-              <a:rPr lang="en-US" dirty="0" smtClean="0"/>
-              <a:t>Projection Surface is matched using Orthographic Camera</a:t>
-            </a:r>
-          </a:p>
-          <a:p>
-            <a:pPr marL="514350" indent="-514350">
-              <a:buAutoNum type="arabicParenR"/>
-            </a:pPr>
-            <a:r>
-              <a:rPr lang="en-US" dirty="0" smtClean="0"/>
-              <a:t>Select the less worst reference frame : it depends on your usage.</a:t>
-            </a:r>
-          </a:p>
-          <a:p>
-            <a:pPr marL="514350" indent="-514350">
-              <a:buAutoNum type="arabicParenR"/>
-            </a:pPr>
-            <a:r>
-              <a:rPr lang="en-US" dirty="0" smtClean="0"/>
-              <a:t>Don’t forget to match Projection surfaces if you need to !</a:t>
-            </a:r>
-          </a:p>
-          <a:p>
-            <a:endParaRPr lang="en-US" dirty="0"/>
-          </a:p>
-        </p:txBody>
-      </p:sp>
-    </p:spTree>
-    <p:extLst>
-      <p:ext uri="{BB962C8B-B14F-4D97-AF65-F5344CB8AC3E}">
-        <p14:creationId xmlns:p14="http://schemas.microsoft.com/office/powerpoint/2010/main" val="2518385329"/>
-      </p:ext>
-    </p:extLst>
-  </p:cSld>
-  <p:clrMapOvr>
-    <a:masterClrMapping/>
-  </p:clrMapOvr>
-  <p:timing>
-    <p:tnLst>
-      <p:par>
-        <p:cTn id="1" dur="indefinite" restart="never" nodeType="tmRoot"/>
-      </p:par>
-    </p:tnLst>
-  </p:timing>
-</p:sld>
-</file>
-
-<file path=ppt/slides/slide14.xml><?xml version="1.0" encoding="utf-8"?>
-<p:sld xmlns:a="http://schemas.openxmlformats.org/drawingml/2006/main" xmlns:r="http://schemas.openxmlformats.org/officeDocument/2006/relationships" xmlns:p="http://schemas.openxmlformats.org/presentationml/2006/main">
-  <p:cSld>
-    <p:spTree>
-      <p:nvGrpSpPr>
-        <p:cNvPr id="1" name=""/>
-        <p:cNvGrpSpPr/>
-        <p:nvPr/>
-      </p:nvGrpSpPr>
-      <p:grpSpPr>
-        <a:xfrm>
-          <a:off x="0" y="0"/>
-          <a:ext cx="0" cy="0"/>
-          <a:chOff x="0" y="0"/>
-          <a:chExt cx="0" cy="0"/>
-        </a:xfrm>
-      </p:grpSpPr>
-      <p:sp>
-        <p:nvSpPr>
-          <p:cNvPr id="2" name="Titre 1"/>
-          <p:cNvSpPr>
-            <a:spLocks noGrp="1"/>
-          </p:cNvSpPr>
-          <p:nvPr>
-            <p:ph type="title"/>
-          </p:nvPr>
-        </p:nvSpPr>
-        <p:spPr/>
-        <p:txBody>
-          <a:bodyPr/>
-          <a:lstStyle/>
-          <a:p>
-            <a:r>
-              <a:rPr lang="en-US" dirty="0" smtClean="0"/>
-              <a:t>Football Project</a:t>
-            </a:r>
-            <a:endParaRPr lang="en-US" dirty="0"/>
-          </a:p>
-        </p:txBody>
-      </p:sp>
-      <p:sp>
-        <p:nvSpPr>
-          <p:cNvPr id="3" name="Espace réservé du contenu 2"/>
-          <p:cNvSpPr>
-            <a:spLocks noGrp="1"/>
-          </p:cNvSpPr>
-          <p:nvPr>
-            <p:ph idx="1"/>
-          </p:nvPr>
-        </p:nvSpPr>
-        <p:spPr>
-          <a:xfrm>
-            <a:off x="457200" y="1600200"/>
-            <a:ext cx="8229600" cy="4800600"/>
-          </a:xfrm>
-        </p:spPr>
-        <p:txBody>
-          <a:bodyPr/>
-          <a:lstStyle/>
-          <a:p>
-            <a:pPr marL="514350" indent="-514350">
-              <a:buAutoNum type="arabicParenR"/>
-            </a:pPr>
-            <a:r>
-              <a:rPr lang="en-US" dirty="0" smtClean="0"/>
-              <a:t>Assets &amp; Animations</a:t>
-            </a:r>
-          </a:p>
-          <a:p>
-            <a:pPr>
-              <a:buFontTx/>
-              <a:buChar char="-"/>
-            </a:pPr>
-            <a:r>
-              <a:rPr lang="en-US" dirty="0" smtClean="0"/>
-              <a:t>Football field and Physical Ball</a:t>
-            </a:r>
-          </a:p>
-          <a:p>
-            <a:pPr marL="0" indent="0">
-              <a:buNone/>
-            </a:pPr>
-            <a:r>
-              <a:rPr lang="en-US" dirty="0" smtClean="0"/>
-              <a:t>2) Shooter Vs virtual </a:t>
-            </a:r>
-            <a:r>
-              <a:rPr lang="en-US" dirty="0" err="1" smtClean="0"/>
-              <a:t>GoalKeeper</a:t>
-            </a:r>
-            <a:endParaRPr lang="en-US" dirty="0" smtClean="0"/>
-          </a:p>
-          <a:p>
-            <a:pPr marL="0" indent="0">
-              <a:buNone/>
-            </a:pPr>
-            <a:r>
-              <a:rPr lang="en-US" dirty="0" smtClean="0"/>
-              <a:t>- Virtual </a:t>
-            </a:r>
-            <a:r>
-              <a:rPr lang="en-US" dirty="0" err="1" smtClean="0"/>
-              <a:t>GoalKeeper</a:t>
-            </a:r>
-            <a:r>
-              <a:rPr lang="en-US" dirty="0" smtClean="0"/>
-              <a:t> Animations</a:t>
-            </a:r>
-          </a:p>
-          <a:p>
-            <a:pPr marL="0" indent="0">
-              <a:buNone/>
-            </a:pPr>
-            <a:r>
-              <a:rPr lang="en-US" dirty="0" smtClean="0"/>
-              <a:t>- Time before Impact Prediction</a:t>
-            </a:r>
-          </a:p>
-          <a:p>
-            <a:pPr marL="0" indent="0">
-              <a:buNone/>
-            </a:pPr>
-            <a:r>
-              <a:rPr lang="en-US" dirty="0" smtClean="0"/>
-              <a:t>3) </a:t>
-            </a:r>
-            <a:r>
-              <a:rPr lang="en-US" dirty="0" err="1" smtClean="0"/>
-              <a:t>GoalKeeper</a:t>
-            </a:r>
-            <a:r>
-              <a:rPr lang="en-US" dirty="0" smtClean="0"/>
-              <a:t> Vs virtual Shooter</a:t>
-            </a:r>
-          </a:p>
-          <a:p>
-            <a:pPr>
-              <a:buFontTx/>
-              <a:buChar char="-"/>
-            </a:pPr>
-            <a:r>
-              <a:rPr lang="en-US" dirty="0" smtClean="0"/>
-              <a:t>Virtual Shooter animations</a:t>
-            </a:r>
-          </a:p>
-          <a:p>
-            <a:pPr>
-              <a:buFontTx/>
-              <a:buChar char="-"/>
-            </a:pPr>
-            <a:r>
-              <a:rPr lang="en-US" dirty="0" smtClean="0"/>
-              <a:t>Supporting Foot variation</a:t>
-            </a:r>
-          </a:p>
-          <a:p>
-            <a:pPr marL="514350" indent="-514350">
-              <a:buAutoNum type="arabicParenR"/>
-            </a:pPr>
-            <a:endParaRPr lang="en-US" dirty="0" smtClean="0"/>
-          </a:p>
-          <a:p>
-            <a:endParaRPr lang="en-US" dirty="0" smtClean="0"/>
-          </a:p>
-        </p:txBody>
-      </p:sp>
-    </p:spTree>
-    <p:extLst>
-      <p:ext uri="{BB962C8B-B14F-4D97-AF65-F5344CB8AC3E}">
-        <p14:creationId xmlns:p14="http://schemas.microsoft.com/office/powerpoint/2010/main" val="2784167349"/>
-      </p:ext>
-    </p:extLst>
-  </p:cSld>
-  <p:clrMapOvr>
-    <a:masterClrMapping/>
-  </p:clrMapOvr>
-  <p:timing>
-    <p:tnLst>
-      <p:par>
-        <p:cTn id="1" dur="indefinite" restart="never" nodeType="tmRoot"/>
-      </p:par>
-    </p:tnLst>
-  </p:timing>
-</p:sld>
-</file>
-
-<file path=ppt/slides/slide15.xml><?xml version="1.0" encoding="utf-8"?>
-<p:sld xmlns:a="http://schemas.openxmlformats.org/drawingml/2006/main" xmlns:r="http://schemas.openxmlformats.org/officeDocument/2006/relationships" xmlns:p="http://schemas.openxmlformats.org/presentationml/2006/main">
-  <p:cSld>
-    <p:spTree>
-      <p:nvGrpSpPr>
-        <p:cNvPr id="1" name=""/>
-        <p:cNvGrpSpPr/>
-        <p:nvPr/>
-      </p:nvGrpSpPr>
-      <p:grpSpPr>
-        <a:xfrm>
-          <a:off x="0" y="0"/>
-          <a:ext cx="0" cy="0"/>
-          <a:chOff x="0" y="0"/>
-          <a:chExt cx="0" cy="0"/>
-        </a:xfrm>
-      </p:grpSpPr>
-      <p:sp>
-        <p:nvSpPr>
-          <p:cNvPr id="2" name="Titre 1"/>
-          <p:cNvSpPr>
-            <a:spLocks noGrp="1"/>
-          </p:cNvSpPr>
-          <p:nvPr>
-            <p:ph type="title"/>
-          </p:nvPr>
-        </p:nvSpPr>
-        <p:spPr/>
-        <p:txBody>
-          <a:bodyPr>
-            <a:normAutofit/>
-          </a:bodyPr>
-          <a:lstStyle/>
-          <a:p>
-            <a:r>
-              <a:rPr lang="en-US" dirty="0" smtClean="0"/>
-              <a:t>Create animations with </a:t>
-            </a:r>
-            <a:r>
-              <a:rPr lang="en-US" dirty="0" err="1" smtClean="0"/>
-              <a:t>Optitrack</a:t>
-            </a:r>
-            <a:endParaRPr lang="en-US" dirty="0"/>
-          </a:p>
-        </p:txBody>
-      </p:sp>
-      <p:sp>
-        <p:nvSpPr>
-          <p:cNvPr id="3" name="Espace réservé du contenu 2"/>
-          <p:cNvSpPr>
-            <a:spLocks noGrp="1"/>
-          </p:cNvSpPr>
-          <p:nvPr>
-            <p:ph idx="1"/>
-          </p:nvPr>
-        </p:nvSpPr>
-        <p:spPr>
-          <a:xfrm>
-            <a:off x="457200" y="1600200"/>
-            <a:ext cx="8229600" cy="4953000"/>
-          </a:xfrm>
-        </p:spPr>
-        <p:txBody>
-          <a:bodyPr>
-            <a:normAutofit fontScale="85000" lnSpcReduction="20000"/>
-          </a:bodyPr>
-          <a:lstStyle/>
-          <a:p>
-            <a:pPr marL="514350" indent="-514350">
-              <a:buAutoNum type="arabicParenR"/>
-            </a:pPr>
-            <a:r>
-              <a:rPr lang="en-US" dirty="0" smtClean="0"/>
-              <a:t>Motion Capture</a:t>
-            </a:r>
-          </a:p>
-          <a:p>
-            <a:pPr marL="514350" indent="-514350">
-              <a:buAutoNum type="arabicParenR"/>
-            </a:pPr>
-            <a:endParaRPr lang="en-US" dirty="0" smtClean="0"/>
-          </a:p>
-          <a:p>
-            <a:pPr marL="514350" indent="-514350">
-              <a:buAutoNum type="arabicParenR"/>
-            </a:pPr>
-            <a:r>
-              <a:rPr lang="en-US" dirty="0" smtClean="0"/>
-              <a:t>BVH Motion Export: data cleaning Vs automated Export: </a:t>
-            </a:r>
-            <a:r>
-              <a:rPr lang="en-US" dirty="0" err="1" smtClean="0"/>
-              <a:t>GoalKeeper</a:t>
-            </a:r>
-            <a:r>
-              <a:rPr lang="en-US" dirty="0" smtClean="0"/>
-              <a:t> </a:t>
-            </a:r>
-            <a:r>
-              <a:rPr lang="en-US" dirty="0" err="1" smtClean="0"/>
-              <a:t>mocap</a:t>
-            </a:r>
-            <a:r>
-              <a:rPr lang="en-US" dirty="0" smtClean="0"/>
-              <a:t> Vs TakToBvhBatch.exe</a:t>
-            </a:r>
-          </a:p>
-          <a:p>
-            <a:pPr marL="514350" indent="-514350">
-              <a:buAutoNum type="arabicParenR"/>
-            </a:pPr>
-            <a:endParaRPr lang="en-US" dirty="0" smtClean="0"/>
-          </a:p>
-          <a:p>
-            <a:pPr marL="514350" indent="-514350">
-              <a:buAutoNum type="arabicParenR"/>
-            </a:pPr>
-            <a:r>
-              <a:rPr lang="en-US" dirty="0" smtClean="0"/>
-              <a:t>Polish motions with </a:t>
-            </a:r>
-            <a:r>
-              <a:rPr lang="en-US" dirty="0"/>
-              <a:t>Motion Builder </a:t>
-            </a:r>
-            <a:r>
-              <a:rPr lang="en-US" dirty="0" smtClean="0"/>
-              <a:t>(ex : </a:t>
-            </a:r>
-            <a:r>
-              <a:rPr lang="en-US" dirty="0" err="1" smtClean="0"/>
-              <a:t>Arret_Greg_Gauche_Retargeted.fbx</a:t>
-            </a:r>
-            <a:r>
-              <a:rPr lang="en-US" dirty="0" smtClean="0"/>
-              <a:t>)</a:t>
-            </a:r>
-          </a:p>
-          <a:p>
-            <a:pPr marL="514350" indent="-514350">
-              <a:buAutoNum type="arabicParenR"/>
-            </a:pPr>
-            <a:endParaRPr lang="en-US" dirty="0" smtClean="0"/>
-          </a:p>
-          <a:p>
-            <a:pPr marL="514350" indent="-514350">
-              <a:buAutoNum type="arabicParenR"/>
-            </a:pPr>
-            <a:r>
-              <a:rPr lang="en-US" dirty="0" smtClean="0"/>
-              <a:t>FBX Motion Export: </a:t>
-            </a:r>
-            <a:r>
-              <a:rPr lang="en-US" dirty="0" err="1" smtClean="0"/>
-              <a:t>BvhToFbxConverter</a:t>
-            </a:r>
-            <a:r>
-              <a:rPr lang="en-US" dirty="0"/>
-              <a:t> (ex: E:\</a:t>
-            </a:r>
-            <a:r>
-              <a:rPr lang="en-US" dirty="0" smtClean="0"/>
-              <a:t>Emmanuel\Projets\Karate\Karate_Motions\BVH)</a:t>
-            </a:r>
-          </a:p>
-          <a:p>
-            <a:pPr marL="514350" indent="-514350">
-              <a:buAutoNum type="arabicParenR"/>
-            </a:pPr>
-            <a:endParaRPr lang="en-US" dirty="0" smtClean="0"/>
-          </a:p>
-          <a:p>
-            <a:pPr marL="514350" indent="-514350">
-              <a:buAutoNum type="arabicParenR"/>
-            </a:pPr>
-            <a:r>
-              <a:rPr lang="en-US" dirty="0" smtClean="0"/>
-              <a:t>Play animations with </a:t>
-            </a:r>
-            <a:r>
-              <a:rPr lang="en-US" dirty="0" err="1" smtClean="0"/>
-              <a:t>Mecanim</a:t>
-            </a:r>
-            <a:r>
-              <a:rPr lang="en-US" dirty="0" smtClean="0"/>
-              <a:t> (Unity3D)</a:t>
-            </a:r>
-            <a:endParaRPr lang="en-US" dirty="0"/>
-          </a:p>
-          <a:p>
-            <a:pPr marL="514350" indent="-514350">
-              <a:buAutoNum type="arabicParenR"/>
-            </a:pPr>
-            <a:endParaRPr lang="en-US" dirty="0"/>
-          </a:p>
-        </p:txBody>
-      </p:sp>
-    </p:spTree>
-    <p:extLst>
-      <p:ext uri="{BB962C8B-B14F-4D97-AF65-F5344CB8AC3E}">
-        <p14:creationId xmlns:p14="http://schemas.microsoft.com/office/powerpoint/2010/main" val="3973491057"/>
-      </p:ext>
-    </p:extLst>
-  </p:cSld>
-  <p:clrMapOvr>
-    <a:masterClrMapping/>
-  </p:clrMapOvr>
-  <p:timing>
-    <p:tnLst>
-      <p:par>
-        <p:cTn id="1" dur="indefinite" restart="never" nodeType="tmRoot"/>
-      </p:par>
-    </p:tnLst>
-  </p:timing>
-</p:sld>
-</file>
-
-<file path=ppt/slides/slide16.xml><?xml version="1.0" encoding="utf-8"?>
-<p:sld xmlns:a="http://schemas.openxmlformats.org/drawingml/2006/main" xmlns:r="http://schemas.openxmlformats.org/officeDocument/2006/relationships" xmlns:p="http://schemas.openxmlformats.org/presentationml/2006/main">
-  <p:cSld>
-    <p:spTree>
-      <p:nvGrpSpPr>
-        <p:cNvPr id="1" name=""/>
-        <p:cNvGrpSpPr/>
-        <p:nvPr/>
-      </p:nvGrpSpPr>
-      <p:grpSpPr>
-        <a:xfrm>
-          <a:off x="0" y="0"/>
-          <a:ext cx="0" cy="0"/>
-          <a:chOff x="0" y="0"/>
-          <a:chExt cx="0" cy="0"/>
-        </a:xfrm>
-      </p:grpSpPr>
-      <p:sp>
-        <p:nvSpPr>
-          <p:cNvPr id="2" name="Titre 1"/>
-          <p:cNvSpPr>
-            <a:spLocks noGrp="1"/>
-          </p:cNvSpPr>
-          <p:nvPr>
-            <p:ph type="title"/>
-          </p:nvPr>
-        </p:nvSpPr>
-        <p:spPr/>
-        <p:txBody>
-          <a:bodyPr>
-            <a:normAutofit fontScale="90000"/>
-          </a:bodyPr>
-          <a:lstStyle/>
-          <a:p>
-            <a:r>
-              <a:rPr lang="en-US" dirty="0" smtClean="0"/>
-              <a:t>Make Humans without </a:t>
-            </a:r>
-            <a:br>
-              <a:rPr lang="en-US" dirty="0" smtClean="0"/>
-            </a:br>
-            <a:r>
-              <a:rPr lang="en-US" dirty="0" smtClean="0"/>
-              <a:t>being an </a:t>
-            </a:r>
-            <a:r>
-              <a:rPr lang="en-US" dirty="0" err="1" smtClean="0"/>
-              <a:t>infographist</a:t>
-            </a:r>
-            <a:endParaRPr lang="en-US" dirty="0"/>
-          </a:p>
-        </p:txBody>
-      </p:sp>
-      <p:sp>
-        <p:nvSpPr>
-          <p:cNvPr id="3" name="Espace réservé du contenu 2"/>
-          <p:cNvSpPr>
-            <a:spLocks noGrp="1"/>
-          </p:cNvSpPr>
-          <p:nvPr>
-            <p:ph idx="1"/>
-          </p:nvPr>
-        </p:nvSpPr>
-        <p:spPr/>
-        <p:txBody>
-          <a:bodyPr/>
-          <a:lstStyle/>
-          <a:p>
-            <a:pPr marL="0" indent="0">
-              <a:buNone/>
-            </a:pPr>
-            <a:r>
-              <a:rPr lang="en-US" dirty="0" smtClean="0"/>
-              <a:t>1) Free Modelling Software</a:t>
-            </a:r>
-          </a:p>
-          <a:p>
-            <a:r>
-              <a:rPr lang="en-US" dirty="0" smtClean="0"/>
-              <a:t>Autodesk Character Generator</a:t>
-            </a:r>
-          </a:p>
-          <a:p>
-            <a:r>
-              <a:rPr lang="en-US" dirty="0" err="1" smtClean="0"/>
-              <a:t>Mixamo</a:t>
-            </a:r>
-            <a:r>
-              <a:rPr lang="en-US" dirty="0" smtClean="0"/>
-              <a:t> Fuse</a:t>
-            </a:r>
-          </a:p>
-          <a:p>
-            <a:r>
-              <a:rPr lang="en-US" dirty="0" err="1" smtClean="0"/>
-              <a:t>MakeHuman</a:t>
-            </a:r>
-            <a:endParaRPr lang="en-US" dirty="0" smtClean="0"/>
-          </a:p>
-          <a:p>
-            <a:pPr marL="0" indent="0">
-              <a:buNone/>
-            </a:pPr>
-            <a:r>
-              <a:rPr lang="en-US" dirty="0" smtClean="0"/>
-              <a:t>2) Scan yourself with Kinect</a:t>
-            </a:r>
-          </a:p>
-          <a:p>
-            <a:r>
-              <a:rPr lang="en-US" dirty="0" smtClean="0"/>
-              <a:t>Pipeline Characters.docx</a:t>
-            </a:r>
-          </a:p>
-          <a:p>
-            <a:r>
-              <a:rPr lang="en-US" dirty="0" smtClean="0"/>
-              <a:t>Test Characters</a:t>
-            </a:r>
-            <a:endParaRPr lang="en-US" dirty="0"/>
-          </a:p>
-        </p:txBody>
-      </p:sp>
-    </p:spTree>
-    <p:extLst>
-      <p:ext uri="{BB962C8B-B14F-4D97-AF65-F5344CB8AC3E}">
-        <p14:creationId xmlns:p14="http://schemas.microsoft.com/office/powerpoint/2010/main" val="1959765003"/>
-      </p:ext>
-    </p:extLst>
-  </p:cSld>
-  <p:clrMapOvr>
-    <a:masterClrMapping/>
-  </p:clrMapOvr>
-  <p:timing>
-    <p:tnLst>
-      <p:par>
-        <p:cTn id="1" dur="indefinite" restart="never" nodeType="tmRoot"/>
-      </p:par>
-    </p:tnLst>
-  </p:timing>
 </p:sld>
 </file>
 
@@ -4405,10 +4148,9 @@
           <a:lstStyle/>
           <a:p>
             <a:r>
-              <a:rPr lang="en-US" dirty="0" smtClean="0"/>
-              <a:t>Why Unity3D ?</a:t>
-            </a:r>
-            <a:endParaRPr lang="en-US" dirty="0"/>
+              <a:rPr lang="en-US" dirty="0"/>
+              <a:t>1. Why Unity3D ?</a:t>
+            </a:r>
           </a:p>
         </p:txBody>
       </p:sp>
@@ -4439,7 +4181,7 @@
               <a:buChar char="•"/>
             </a:pPr>
             <a:r>
-              <a:rPr lang="en-US" sz="3600" dirty="0" smtClean="0"/>
+              <a:rPr lang="en-US" sz="3600" dirty="0"/>
               <a:t>User-friendly</a:t>
             </a:r>
           </a:p>
@@ -4449,7 +4191,7 @@
               <a:buChar char="•"/>
             </a:pPr>
             <a:r>
-              <a:rPr lang="en-US" sz="3600" dirty="0" smtClean="0"/>
+              <a:rPr lang="en-US" sz="3600" dirty="0"/>
               <a:t>Very Good Support (Community, Forums)</a:t>
             </a:r>
           </a:p>
@@ -4459,7 +4201,7 @@
               <a:buChar char="•"/>
             </a:pPr>
             <a:r>
-              <a:rPr lang="en-US" sz="3600" dirty="0" smtClean="0"/>
+              <a:rPr lang="en-US" sz="3600" dirty="0"/>
               <a:t>High Quality integrated tools (Physics, Lightning, Rendering, Animation, Network)</a:t>
             </a:r>
           </a:p>
@@ -4468,7 +4210,7 @@
               <a:buFont typeface="Arial" panose="020B0604020202020204" pitchFamily="34" charset="0"/>
               <a:buChar char="•"/>
             </a:pPr>
-            <a:endParaRPr lang="en-US" sz="3600" dirty="0" smtClean="0"/>
+            <a:endParaRPr lang="en-US" sz="3600" dirty="0"/>
           </a:p>
           <a:p>
             <a:pPr marL="285750" indent="-285750">
@@ -4489,22 +4231,14 @@
               <a:buChar char="•"/>
             </a:pPr>
             <a:r>
-              <a:rPr lang="en-US" sz="3600" dirty="0" smtClean="0"/>
-              <a:t>Others Game Engines not so easy !</a:t>
-            </a:r>
-          </a:p>
-          <a:p>
-            <a:r>
-              <a:rPr lang="en-US" sz="3600" dirty="0" smtClean="0"/>
-              <a:t>Unreal Engine / </a:t>
-            </a:r>
-            <a:r>
-              <a:rPr lang="en-US" sz="3600" dirty="0" err="1" smtClean="0"/>
-              <a:t>CryEngine</a:t>
-            </a:r>
-            <a:r>
-              <a:rPr lang="en-US" sz="3600" dirty="0" smtClean="0"/>
-              <a:t> / Source</a:t>
+              <a:rPr lang="en-US" sz="3600" dirty="0"/>
+              <a:t>Others Game Engines not that easy !</a:t>
+            </a:r>
+          </a:p>
+          <a:p>
+            <a:r>
+              <a:rPr lang="en-US" sz="3600" dirty="0"/>
+              <a:t>Unreal Engine / CryEngine / Source / Godot</a:t>
             </a:r>
           </a:p>
         </p:txBody>
@@ -4519,13 +4253,6 @@
   <p:clrMapOvr>
     <a:masterClrMapping/>
   </p:clrMapOvr>
-  <p:timing>
-    <p:tnLst>
-      <p:par>
-        <p:cTn id="1" dur="indefinite" restart="never" nodeType="tmRoot"/>
-      </p:par>
-    </p:tnLst>
-  </p:timing>
 </p:sld>
 </file>
 
@@ -4562,10 +4289,9 @@
           <a:lstStyle/>
           <a:p>
             <a:r>
-              <a:rPr lang="en-US" dirty="0" smtClean="0"/>
-              <a:t>Unity Basics: Interface </a:t>
-            </a:r>
-            <a:endParaRPr lang="en-US" dirty="0"/>
+              <a:rPr lang="en-US" dirty="0"/>
+              <a:t>2. Unity3D Interface </a:t>
+            </a:r>
           </a:p>
         </p:txBody>
       </p:sp>
@@ -4587,43 +4313,43 @@
           <a:lstStyle/>
           <a:p>
             <a:r>
-              <a:rPr lang="en-US" dirty="0" smtClean="0"/>
+              <a:rPr lang="en-US" dirty="0"/>
               <a:t>Scene / Game views</a:t>
             </a:r>
           </a:p>
           <a:p>
-            <a:endParaRPr lang="en-US" dirty="0" smtClean="0"/>
-          </a:p>
-          <a:p>
-            <a:r>
-              <a:rPr lang="en-US" dirty="0" smtClean="0"/>
+            <a:endParaRPr lang="en-US" dirty="0"/>
+          </a:p>
+          <a:p>
+            <a:r>
+              <a:rPr lang="en-US" dirty="0"/>
               <a:t>Hierarchy / Project tabs</a:t>
             </a:r>
           </a:p>
           <a:p>
-            <a:endParaRPr lang="en-US" dirty="0" smtClean="0"/>
-          </a:p>
-          <a:p>
-            <a:r>
-              <a:rPr lang="en-US" dirty="0" smtClean="0"/>
+            <a:endParaRPr lang="en-US" dirty="0"/>
+          </a:p>
+          <a:p>
+            <a:r>
+              <a:rPr lang="en-US" dirty="0"/>
               <a:t>Console / Profiler tabs</a:t>
             </a:r>
           </a:p>
           <a:p>
-            <a:endParaRPr lang="en-US" dirty="0" smtClean="0"/>
-          </a:p>
-          <a:p>
-            <a:r>
-              <a:rPr lang="en-US" dirty="0" smtClean="0"/>
+            <a:endParaRPr lang="en-US" dirty="0"/>
+          </a:p>
+          <a:p>
+            <a:r>
+              <a:rPr lang="en-US" dirty="0"/>
               <a:t>The Inspector</a:t>
             </a:r>
           </a:p>
           <a:p>
-            <a:endParaRPr lang="en-US" dirty="0" smtClean="0"/>
-          </a:p>
-          <a:p>
-            <a:r>
-              <a:rPr lang="en-US" dirty="0" smtClean="0"/>
+            <a:endParaRPr lang="en-US" dirty="0"/>
+          </a:p>
+          <a:p>
+            <a:r>
+              <a:rPr lang="en-US" dirty="0"/>
               <a:t>Other windows (Audio, Animation, Animator, Lightning, Navigation)</a:t>
             </a:r>
           </a:p>
@@ -4639,13 +4365,6 @@
   <p:clrMapOvr>
     <a:masterClrMapping/>
   </p:clrMapOvr>
-  <p:timing>
-    <p:tnLst>
-      <p:par>
-        <p:cTn id="1" dur="indefinite" restart="never" nodeType="tmRoot"/>
-      </p:par>
-    </p:tnLst>
-  </p:timing>
 </p:sld>
 </file>
 
@@ -4682,10 +4401,9 @@
           <a:lstStyle/>
           <a:p>
             <a:r>
-              <a:rPr lang="en-US" dirty="0" smtClean="0"/>
-              <a:t>Unity Basics: Configuration</a:t>
-            </a:r>
-            <a:endParaRPr lang="en-US" dirty="0"/>
+              <a:rPr lang="en-US" dirty="0"/>
+              <a:t>3. Unity3D Configuration</a:t>
+            </a:r>
           </a:p>
         </p:txBody>
       </p:sp>
@@ -4715,7 +4433,7 @@
               <a:buNone/>
             </a:pPr>
             <a:r>
-              <a:rPr lang="en-US" dirty="0" smtClean="0"/>
+              <a:rPr lang="en-US" dirty="0"/>
               <a:t>1) Set your Keys in Edit &gt; Preferences !</a:t>
             </a:r>
           </a:p>
@@ -4724,7 +4442,7 @@
               <a:buNone/>
             </a:pPr>
             <a:r>
-              <a:rPr lang="en-US" dirty="0" smtClean="0"/>
+              <a:rPr lang="en-US" dirty="0"/>
               <a:t>2) Take a look at the Project settings :</a:t>
             </a:r>
           </a:p>
@@ -4734,7 +4452,7 @@
               <a:buChar char="-"/>
             </a:pPr>
             <a:r>
-              <a:rPr lang="en-US" dirty="0" smtClean="0"/>
+              <a:rPr lang="en-US" dirty="0"/>
               <a:t>Input</a:t>
             </a:r>
           </a:p>
@@ -4744,7 +4462,7 @@
               <a:buChar char="-"/>
             </a:pPr>
             <a:r>
-              <a:rPr lang="en-US" dirty="0" smtClean="0"/>
+              <a:rPr lang="en-US" dirty="0"/>
               <a:t>Tags &amp; Layers</a:t>
             </a:r>
           </a:p>
@@ -4754,7 +4472,7 @@
               <a:buChar char="-"/>
             </a:pPr>
             <a:r>
-              <a:rPr lang="en-US" dirty="0" smtClean="0"/>
+              <a:rPr lang="en-US" dirty="0"/>
               <a:t>Audio / Time / Physics</a:t>
             </a:r>
           </a:p>
@@ -4764,7 +4482,7 @@
               <a:buChar char="-"/>
             </a:pPr>
             <a:r>
-              <a:rPr lang="en-US" dirty="0" smtClean="0"/>
+              <a:rPr lang="en-US" dirty="0"/>
               <a:t>Quality / Graphics</a:t>
             </a:r>
           </a:p>
@@ -4774,7 +4492,7 @@
               <a:buChar char="-"/>
             </a:pPr>
             <a:r>
-              <a:rPr lang="en-US" dirty="0" smtClean="0"/>
+              <a:rPr lang="en-US" dirty="0"/>
               <a:t>Network</a:t>
             </a:r>
           </a:p>
@@ -4784,7 +4502,7 @@
               <a:buChar char="-"/>
             </a:pPr>
             <a:r>
-              <a:rPr lang="en-US" dirty="0" smtClean="0"/>
+              <a:rPr lang="en-US" dirty="0"/>
               <a:t>Editor</a:t>
             </a:r>
           </a:p>
@@ -4794,7 +4512,7 @@
               <a:buChar char="-"/>
             </a:pPr>
             <a:r>
-              <a:rPr lang="en-US" dirty="0" smtClean="0"/>
+              <a:rPr lang="en-US" dirty="0"/>
               <a:t>Script Execution Order</a:t>
             </a:r>
           </a:p>
@@ -4802,13 +4520,13 @@
             <a:pPr marL="0" indent="0">
               <a:buNone/>
             </a:pPr>
-            <a:endParaRPr lang="en-US" dirty="0" smtClean="0"/>
+            <a:endParaRPr lang="en-US" dirty="0"/>
           </a:p>
           <a:p>
             <a:pPr marL="514350" indent="-514350">
               <a:buAutoNum type="arabicParenR"/>
             </a:pPr>
-            <a:endParaRPr lang="en-US" dirty="0" smtClean="0"/>
+            <a:endParaRPr lang="en-US" dirty="0"/>
           </a:p>
           <a:p>
             <a:endParaRPr lang="en-US" dirty="0"/>
@@ -4825,13 +4543,6 @@
   <p:clrMapOvr>
     <a:masterClrMapping/>
   </p:clrMapOvr>
-  <p:timing>
-    <p:tnLst>
-      <p:par>
-        <p:cTn id="1" dur="indefinite" restart="never" nodeType="tmRoot"/>
-      </p:par>
-    </p:tnLst>
-  </p:timing>
 </p:sld>
 </file>
 
@@ -4868,12 +4579,12 @@
           <a:lstStyle/>
           <a:p>
             <a:r>
-              <a:rPr lang="en-US" dirty="0" smtClean="0"/>
-              <a:t>Unity Basics: </a:t>
-            </a:r>
-            <a:r>
-              <a:rPr lang="en-US" dirty="0" err="1" smtClean="0"/>
-              <a:t>MonoBehaviour</a:t>
+              <a:rPr lang="en-US" dirty="0"/>
+              <a:t>4. </a:t>
+            </a:r>
+            <a:r>
+              <a:rPr lang="en-US" dirty="0" err="1"/>
+              <a:t>GameObject</a:t>
             </a:r>
             <a:endParaRPr lang="en-US" dirty="0"/>
           </a:p>
@@ -4892,7 +4603,7 @@
         <p:spPr/>
         <p:txBody>
           <a:bodyPr>
-            <a:normAutofit lnSpcReduction="10000"/>
+            <a:normAutofit fontScale="85000" lnSpcReduction="20000"/>
           </a:bodyPr>
           <a:lstStyle/>
           <a:p>
@@ -4900,7 +4611,7 @@
               <a:buAutoNum type="arabicParenR"/>
             </a:pPr>
             <a:r>
-              <a:rPr lang="en-US" dirty="0" smtClean="0"/>
+              <a:rPr lang="en-US" dirty="0"/>
               <a:t>Drag an object in the scene</a:t>
             </a:r>
           </a:p>
@@ -4909,36 +4620,30 @@
               <a:buAutoNum type="arabicParenR"/>
             </a:pPr>
             <a:r>
-              <a:rPr lang="en-US" dirty="0" smtClean="0"/>
-              <a:t>Give it a behavior (</a:t>
-            </a:r>
-            <a:r>
-              <a:rPr lang="en-US" dirty="0" err="1" smtClean="0"/>
+              <a:rPr lang="en-US" dirty="0"/>
+              <a:t>Give it a </a:t>
+            </a:r>
+            <a:r>
+              <a:rPr lang="en-US" dirty="0" err="1"/>
+              <a:t>behaviour</a:t>
+            </a:r>
+            <a:r>
+              <a:rPr lang="en-US" dirty="0"/>
+              <a:t> (</a:t>
+            </a:r>
+            <a:r>
+              <a:rPr lang="en-US" dirty="0" err="1"/>
               <a:t>MonoBehaviour</a:t>
             </a:r>
             <a:r>
-              <a:rPr lang="en-US" dirty="0" smtClean="0"/>
+              <a:rPr lang="en-US" dirty="0"/>
               <a:t>)</a:t>
             </a:r>
           </a:p>
           <a:p>
             <a:r>
-              <a:rPr lang="en-US" dirty="0" smtClean="0"/>
+              <a:rPr lang="en-US" dirty="0"/>
               <a:t>Awake() : </a:t>
-            </a:r>
-            <a:r>
-              <a:rPr lang="en-US" dirty="0" err="1" smtClean="0"/>
-              <a:t>Init</a:t>
-            </a:r>
-            <a:r>
-              <a:rPr lang="en-US" dirty="0" smtClean="0"/>
-              <a:t> 1</a:t>
-            </a:r>
-          </a:p>
-          <a:p>
-            <a:r>
-              <a:rPr lang="en-US" dirty="0" smtClean="0"/>
-              <a:t>Start() : </a:t>
             </a:r>
             <a:r>
               <a:rPr lang="en-US" dirty="0" err="1"/>
@@ -4946,55 +4651,77 @@
             </a:r>
             <a:r>
               <a:rPr lang="en-US" dirty="0"/>
-              <a:t> </a:t>
-            </a:r>
-            <a:r>
-              <a:rPr lang="en-US" dirty="0" smtClean="0"/>
-              <a:t>2</a:t>
-            </a:r>
-          </a:p>
-          <a:p>
-            <a:r>
-              <a:rPr lang="en-US" dirty="0" smtClean="0"/>
+              <a:t> 1</a:t>
+            </a:r>
+          </a:p>
+          <a:p>
+            <a:r>
+              <a:rPr lang="en-US" dirty="0"/>
+              <a:t>Start() : </a:t>
+            </a:r>
+            <a:r>
+              <a:rPr lang="en-US" dirty="0" err="1"/>
+              <a:t>Init</a:t>
+            </a:r>
+            <a:r>
+              <a:rPr lang="en-US" dirty="0"/>
+              <a:t> 2</a:t>
+            </a:r>
+          </a:p>
+          <a:p>
+            <a:r>
+              <a:rPr lang="en-US" dirty="0"/>
               <a:t>Update() : Game loop, animate things here !</a:t>
             </a:r>
           </a:p>
           <a:p>
             <a:r>
-              <a:rPr lang="en-US" dirty="0" err="1" smtClean="0"/>
+              <a:rPr lang="en-US" dirty="0" err="1"/>
               <a:t>LateUpdate</a:t>
             </a:r>
             <a:r>
-              <a:rPr lang="en-US" dirty="0" smtClean="0"/>
+              <a:rPr lang="en-US" dirty="0"/>
               <a:t>() : Finalize Animations</a:t>
             </a:r>
           </a:p>
           <a:p>
             <a:r>
-              <a:rPr lang="en-US" dirty="0" err="1" smtClean="0"/>
+              <a:rPr lang="en-US" dirty="0" err="1"/>
               <a:t>OnEnable</a:t>
             </a:r>
             <a:r>
-              <a:rPr lang="en-US" dirty="0" smtClean="0"/>
+              <a:rPr lang="en-US" dirty="0"/>
               <a:t>() / </a:t>
             </a:r>
             <a:r>
-              <a:rPr lang="en-US" dirty="0" err="1" smtClean="0"/>
+              <a:rPr lang="en-US" dirty="0" err="1"/>
               <a:t>OnDisable</a:t>
             </a:r>
             <a:r>
-              <a:rPr lang="en-US" dirty="0" smtClean="0"/>
+              <a:rPr lang="en-US" dirty="0"/>
               <a:t>()</a:t>
             </a:r>
           </a:p>
           <a:p>
             <a:r>
-              <a:rPr lang="en-US" dirty="0" err="1" smtClean="0"/>
+              <a:rPr lang="en-US" dirty="0" err="1"/>
               <a:t>OnDestroy</a:t>
             </a:r>
             <a:r>
-              <a:rPr lang="en-US" dirty="0" smtClean="0"/>
+              <a:rPr lang="en-US" dirty="0"/>
               <a:t>() : Clean up if you need </a:t>
+            </a:r>
+          </a:p>
+          <a:p>
+            <a:endParaRPr lang="en-US" dirty="0"/>
+          </a:p>
+          <a:p>
+            <a:pPr marL="0" indent="0">
+              <a:buNone/>
+            </a:pPr>
+            <a:r>
+              <a:rPr lang="en-US" dirty="0"/>
+              <a:t>https://docs.unity3d.com/Manual/ExecutionOrder.html</a:t>
             </a:r>
           </a:p>
         </p:txBody>
@@ -5009,13 +4736,6 @@
   <p:clrMapOvr>
     <a:masterClrMapping/>
   </p:clrMapOvr>
-  <p:timing>
-    <p:tnLst>
-      <p:par>
-        <p:cTn id="1" dur="indefinite" restart="never" nodeType="tmRoot"/>
-      </p:par>
-    </p:tnLst>
-  </p:timing>
 </p:sld>
 </file>
 
@@ -5052,10 +4772,9 @@
           <a:lstStyle/>
           <a:p>
             <a:r>
-              <a:rPr lang="en-US" dirty="0" smtClean="0"/>
-              <a:t>Unity Basics: Game Tutorial</a:t>
-            </a:r>
-            <a:endParaRPr lang="en-US" dirty="0"/>
+              <a:rPr lang="en-US" dirty="0"/>
+              <a:t>5. Physics</a:t>
+            </a:r>
           </a:p>
         </p:txBody>
       </p:sp>
@@ -5069,25 +4788,24 @@
             <p:ph idx="1"/>
           </p:nvPr>
         </p:nvSpPr>
-        <p:spPr/>
-        <p:txBody>
-          <a:bodyPr/>
+        <p:spPr>
+          <a:xfrm>
+            <a:off x="457200" y="1600200"/>
+            <a:ext cx="8229600" cy="4876800"/>
+          </a:xfrm>
+        </p:spPr>
+        <p:txBody>
+          <a:bodyPr>
+            <a:normAutofit fontScale="92500" lnSpcReduction="10000"/>
+          </a:bodyPr>
           <a:lstStyle/>
           <a:p>
             <a:pPr marL="514350" indent="-514350">
               <a:buAutoNum type="arabicParenR"/>
             </a:pPr>
             <a:r>
-              <a:rPr lang="en-US" dirty="0" smtClean="0"/>
-              <a:t>Understand </a:t>
-            </a:r>
-            <a:r>
-              <a:rPr lang="en-US" dirty="0" err="1" smtClean="0"/>
-              <a:t>MonoBehaviour</a:t>
-            </a:r>
-            <a:r>
-              <a:rPr lang="en-US" dirty="0" smtClean="0"/>
-              <a:t> Methods</a:t>
+              <a:rPr lang="en-US" dirty="0"/>
+              <a:t>Collider: the physical shape of your object</a:t>
             </a:r>
           </a:p>
           <a:p>
@@ -5095,89 +4813,89 @@
               <a:buAutoNum type="arabicParenR"/>
             </a:pPr>
             <a:r>
-              <a:rPr lang="en-US" dirty="0" smtClean="0"/>
-              <a:t>Create Controllable Player (Input &amp; Camera)</a:t>
-            </a:r>
-          </a:p>
-          <a:p>
-            <a:pPr marL="514350" indent="-514350">
-              <a:buAutoNum type="arabicParenR"/>
-            </a:pPr>
-            <a:r>
-              <a:rPr lang="en-US" dirty="0" smtClean="0"/>
-              <a:t>Add a terrain (</a:t>
-            </a:r>
-            <a:r>
               <a:rPr lang="en-US" dirty="0" err="1"/>
-              <a:t>h</a:t>
-            </a:r>
-            <a:r>
-              <a:rPr lang="en-US" dirty="0" err="1" smtClean="0"/>
-              <a:t>eightmap</a:t>
-            </a:r>
-            <a:r>
-              <a:rPr lang="en-US" dirty="0" smtClean="0"/>
-              <a:t>, textures, details)</a:t>
-            </a:r>
-          </a:p>
-          <a:p>
-            <a:pPr marL="514350" indent="-514350">
-              <a:buAutoNum type="arabicParenR"/>
-            </a:pPr>
-            <a:r>
-              <a:rPr lang="en-US" dirty="0" smtClean="0"/>
-              <a:t>Add Physics to the Player</a:t>
-            </a:r>
-          </a:p>
-          <a:p>
-            <a:pPr marL="514350" indent="-514350">
-              <a:buAutoNum type="arabicParenR"/>
-            </a:pPr>
-            <a:r>
-              <a:rPr lang="en-US" dirty="0" smtClean="0"/>
-              <a:t>Add Bonus objects</a:t>
-            </a:r>
-          </a:p>
-          <a:p>
-            <a:pPr marL="514350" indent="-514350">
-              <a:buAutoNum type="arabicParenR"/>
-            </a:pPr>
-            <a:r>
-              <a:rPr lang="en-US" dirty="0" smtClean="0"/>
-              <a:t>Add a Game logic</a:t>
-            </a:r>
-          </a:p>
-          <a:p>
-            <a:pPr marL="514350" indent="-514350">
-              <a:buAutoNum type="arabicParenR"/>
-            </a:pPr>
-            <a:r>
-              <a:rPr lang="en-US" dirty="0" smtClean="0"/>
-              <a:t>Add UI</a:t>
+              <a:t>RigidBody</a:t>
+            </a:r>
+            <a:r>
+              <a:rPr lang="en-US" dirty="0"/>
+              <a:t>: Make your object react to Physics</a:t>
             </a:r>
           </a:p>
           <a:p>
             <a:endParaRPr lang="en-US" dirty="0"/>
+          </a:p>
+          <a:p>
+            <a:r>
+              <a:rPr lang="en-US" dirty="0"/>
+              <a:t>All the code dealing with </a:t>
+            </a:r>
+            <a:r>
+              <a:rPr lang="en-US" dirty="0" err="1"/>
+              <a:t>RigidBody</a:t>
+            </a:r>
+            <a:r>
+              <a:rPr lang="en-US" dirty="0"/>
+              <a:t> should be put in </a:t>
+            </a:r>
+            <a:r>
+              <a:rPr lang="en-US" dirty="0" err="1"/>
+              <a:t>FixedUpdate</a:t>
+            </a:r>
+            <a:r>
+              <a:rPr lang="en-US" dirty="0"/>
+              <a:t>() </a:t>
+            </a:r>
+          </a:p>
+          <a:p>
+            <a:endParaRPr lang="en-US" dirty="0"/>
+          </a:p>
+          <a:p>
+            <a:r>
+              <a:rPr lang="en-US" dirty="0" err="1"/>
+              <a:t>FixedUpdate</a:t>
+            </a:r>
+            <a:r>
+              <a:rPr lang="en-US" dirty="0"/>
+              <a:t>() is Unity Physics loop, </a:t>
+            </a:r>
+            <a:r>
+              <a:rPr lang="en-US" dirty="0" err="1"/>
+              <a:t>timestep</a:t>
+            </a:r>
+            <a:r>
+              <a:rPr lang="en-US" dirty="0"/>
+              <a:t> is constant</a:t>
+            </a:r>
+          </a:p>
+          <a:p>
+            <a:endParaRPr lang="en-US" dirty="0"/>
+          </a:p>
+          <a:p>
+            <a:r>
+              <a:rPr lang="en-US" dirty="0"/>
+              <a:t>Update() &amp; </a:t>
+            </a:r>
+            <a:r>
+              <a:rPr lang="en-US" dirty="0" err="1"/>
+              <a:t>LateUpdate</a:t>
+            </a:r>
+            <a:r>
+              <a:rPr lang="en-US" dirty="0"/>
+              <a:t>() are not !</a:t>
+            </a:r>
           </a:p>
         </p:txBody>
       </p:sp>
     </p:spTree>
     <p:extLst>
       <p:ext uri="{BB962C8B-B14F-4D97-AF65-F5344CB8AC3E}">
-        <p14:creationId xmlns:p14="http://schemas.microsoft.com/office/powerpoint/2010/main" val="1333297839"/>
+        <p14:creationId xmlns:p14="http://schemas.microsoft.com/office/powerpoint/2010/main" val="3350895736"/>
       </p:ext>
     </p:extLst>
   </p:cSld>
   <p:clrMapOvr>
     <a:masterClrMapping/>
   </p:clrMapOvr>
-  <p:timing>
-    <p:tnLst>
-      <p:par>
-        <p:cTn id="1" dur="indefinite" restart="never" nodeType="tmRoot"/>
-      </p:par>
-    </p:tnLst>
-  </p:timing>
 </p:sld>
 </file>
 
@@ -5214,10 +4932,9 @@
           <a:lstStyle/>
           <a:p>
             <a:r>
-              <a:rPr lang="en-US" dirty="0" smtClean="0"/>
-              <a:t>Physics</a:t>
-            </a:r>
-            <a:endParaRPr lang="en-US" dirty="0"/>
+              <a:rPr lang="en-US" dirty="0"/>
+              <a:t>6. Game</a:t>
+            </a:r>
           </a:p>
         </p:txBody>
       </p:sp>
@@ -5231,24 +4948,25 @@
             <p:ph idx="1"/>
           </p:nvPr>
         </p:nvSpPr>
-        <p:spPr>
-          <a:xfrm>
-            <a:off x="457200" y="1600200"/>
-            <a:ext cx="8229600" cy="4876800"/>
-          </a:xfrm>
-        </p:spPr>
-        <p:txBody>
-          <a:bodyPr>
-            <a:normAutofit fontScale="92500" lnSpcReduction="10000"/>
-          </a:bodyPr>
+        <p:spPr/>
+        <p:txBody>
+          <a:bodyPr/>
           <a:lstStyle/>
           <a:p>
             <a:pPr marL="514350" indent="-514350">
               <a:buAutoNum type="arabicParenR"/>
             </a:pPr>
             <a:r>
-              <a:rPr lang="en-US" dirty="0" smtClean="0"/>
-              <a:t>Collider: the physical shape of your object</a:t>
+              <a:rPr lang="en-US" dirty="0"/>
+              <a:t>Understand </a:t>
+            </a:r>
+            <a:r>
+              <a:rPr lang="en-US" dirty="0" err="1"/>
+              <a:t>MonoBehaviour</a:t>
+            </a:r>
+            <a:r>
+              <a:rPr lang="en-US" dirty="0"/>
+              <a:t> Methods</a:t>
             </a:r>
           </a:p>
           <a:p>
@@ -5256,121 +4974,78 @@
               <a:buAutoNum type="arabicParenR"/>
             </a:pPr>
             <a:r>
-              <a:rPr lang="en-US" dirty="0" err="1" smtClean="0"/>
-              <a:t>RigidBody</a:t>
-            </a:r>
-            <a:r>
-              <a:rPr lang="en-US" dirty="0" smtClean="0"/>
-              <a:t>: Make your object react to Physics</a:t>
+              <a:rPr lang="en-US" dirty="0"/>
+              <a:t>Create Controllable Player (Input &amp; Camera)</a:t>
+            </a:r>
+          </a:p>
+          <a:p>
+            <a:pPr marL="514350" indent="-514350">
+              <a:buAutoNum type="arabicParenR"/>
+            </a:pPr>
+            <a:r>
+              <a:rPr lang="en-US" dirty="0"/>
+              <a:t>Add a terrain (</a:t>
+            </a:r>
+            <a:r>
+              <a:rPr lang="en-US" dirty="0" err="1"/>
+              <a:t>heightmap</a:t>
+            </a:r>
+            <a:r>
+              <a:rPr lang="en-US" dirty="0"/>
+              <a:t>, textures, details)</a:t>
+            </a:r>
+          </a:p>
+          <a:p>
+            <a:pPr marL="514350" indent="-514350">
+              <a:buAutoNum type="arabicParenR"/>
+            </a:pPr>
+            <a:r>
+              <a:rPr lang="en-US" dirty="0"/>
+              <a:t>Add Physics to the Player</a:t>
+            </a:r>
+          </a:p>
+          <a:p>
+            <a:pPr marL="514350" indent="-514350">
+              <a:buAutoNum type="arabicParenR"/>
+            </a:pPr>
+            <a:r>
+              <a:rPr lang="en-US" dirty="0"/>
+              <a:t>Add Bonus objects</a:t>
+            </a:r>
+          </a:p>
+          <a:p>
+            <a:pPr marL="514350" indent="-514350">
+              <a:buAutoNum type="arabicParenR"/>
+            </a:pPr>
+            <a:r>
+              <a:rPr lang="en-US" dirty="0"/>
+              <a:t>Add a Game logic</a:t>
+            </a:r>
+          </a:p>
+          <a:p>
+            <a:pPr marL="514350" indent="-514350">
+              <a:buAutoNum type="arabicParenR"/>
+            </a:pPr>
+            <a:r>
+              <a:rPr lang="en-US" dirty="0"/>
+              <a:t>Add UI</a:t>
             </a:r>
           </a:p>
           <a:p>
             <a:endParaRPr lang="en-US" dirty="0"/>
-          </a:p>
-          <a:p>
-            <a:r>
-              <a:rPr lang="en-US" dirty="0" smtClean="0"/>
-              <a:t>All </a:t>
-            </a:r>
-            <a:r>
-              <a:rPr lang="en-US" dirty="0"/>
-              <a:t>the code </a:t>
-            </a:r>
-            <a:r>
-              <a:rPr lang="en-US" dirty="0" smtClean="0"/>
-              <a:t>dealing </a:t>
-            </a:r>
-            <a:r>
-              <a:rPr lang="en-US" dirty="0"/>
-              <a:t>with </a:t>
-            </a:r>
-            <a:r>
-              <a:rPr lang="en-US" dirty="0" err="1"/>
-              <a:t>RigidBody</a:t>
-            </a:r>
-            <a:r>
-              <a:rPr lang="en-US" dirty="0"/>
-              <a:t> </a:t>
-            </a:r>
-            <a:r>
-              <a:rPr lang="en-US" dirty="0" smtClean="0"/>
-              <a:t>should </a:t>
-            </a:r>
-            <a:r>
-              <a:rPr lang="en-US" dirty="0"/>
-              <a:t>be </a:t>
-            </a:r>
-            <a:r>
-              <a:rPr lang="en-US" dirty="0" smtClean="0"/>
-              <a:t>put in </a:t>
-            </a:r>
-            <a:r>
-              <a:rPr lang="en-US" dirty="0" err="1"/>
-              <a:t>FixedUpdate</a:t>
-            </a:r>
-            <a:r>
-              <a:rPr lang="en-US" dirty="0"/>
-              <a:t>() </a:t>
-            </a:r>
-            <a:endParaRPr lang="en-US" dirty="0" smtClean="0"/>
-          </a:p>
-          <a:p>
-            <a:endParaRPr lang="en-US" dirty="0" smtClean="0"/>
-          </a:p>
-          <a:p>
-            <a:r>
-              <a:rPr lang="en-US" dirty="0" err="1" smtClean="0"/>
-              <a:t>FixedUpdate</a:t>
-            </a:r>
-            <a:r>
-              <a:rPr lang="en-US" dirty="0" smtClean="0"/>
-              <a:t>() is Unity Physics loop, </a:t>
-            </a:r>
-            <a:r>
-              <a:rPr lang="en-US" dirty="0" err="1" smtClean="0"/>
-              <a:t>timestep</a:t>
-            </a:r>
-            <a:r>
-              <a:rPr lang="en-US" dirty="0" smtClean="0"/>
-              <a:t> is constant</a:t>
-            </a:r>
-          </a:p>
-          <a:p>
-            <a:endParaRPr lang="en-US" dirty="0" smtClean="0"/>
-          </a:p>
-          <a:p>
-            <a:r>
-              <a:rPr lang="en-US" dirty="0" smtClean="0"/>
-              <a:t>Update() &amp; </a:t>
-            </a:r>
-            <a:r>
-              <a:rPr lang="en-US" dirty="0" err="1" smtClean="0"/>
-              <a:t>LateUpdate</a:t>
-            </a:r>
-            <a:r>
-              <a:rPr lang="en-US" dirty="0" smtClean="0"/>
-              <a:t>() are not !</a:t>
-            </a:r>
           </a:p>
         </p:txBody>
       </p:sp>
     </p:spTree>
     <p:extLst>
       <p:ext uri="{BB962C8B-B14F-4D97-AF65-F5344CB8AC3E}">
-        <p14:creationId xmlns:p14="http://schemas.microsoft.com/office/powerpoint/2010/main" val="3350895736"/>
+        <p14:creationId xmlns:p14="http://schemas.microsoft.com/office/powerpoint/2010/main" val="1333297839"/>
       </p:ext>
     </p:extLst>
   </p:cSld>
   <p:clrMapOvr>
     <a:masterClrMapping/>
   </p:clrMapOvr>
-  <p:timing>
-    <p:tnLst>
-      <p:par>
-        <p:cTn id="1" dur="indefinite" restart="never" nodeType="tmRoot"/>
-      </p:par>
-    </p:tnLst>
-  </p:timing>
 </p:sld>
 </file>
 
@@ -5407,10 +5082,9 @@
           <a:lstStyle/>
           <a:p>
             <a:r>
-              <a:rPr lang="en-US" dirty="0" smtClean="0"/>
-              <a:t>Lighting</a:t>
-            </a:r>
-            <a:endParaRPr lang="en-US" dirty="0"/>
+              <a:rPr lang="en-US" dirty="0"/>
+              <a:t>7. Animation</a:t>
+            </a:r>
           </a:p>
         </p:txBody>
       </p:sp>
@@ -5424,77 +5098,100 @@
             <p:ph idx="1"/>
           </p:nvPr>
         </p:nvSpPr>
-        <p:spPr/>
+        <p:spPr>
+          <a:xfrm>
+            <a:off x="457200" y="1600200"/>
+            <a:ext cx="8229600" cy="4983162"/>
+          </a:xfrm>
+        </p:spPr>
         <p:txBody>
           <a:bodyPr>
             <a:normAutofit fontScale="92500" lnSpcReduction="10000"/>
           </a:bodyPr>
           <a:lstStyle/>
           <a:p>
-            <a:pPr marL="514350" indent="-514350">
-              <a:buAutoNum type="arabicParenR"/>
+            <a:pPr marL="0" indent="0">
+              <a:buNone/>
             </a:pPr>
             <a:r>
-              <a:rPr lang="en-US" dirty="0" smtClean="0"/>
-              <a:t>Setup your static environment: all the non-moving object should be set to static !</a:t>
+              <a:rPr lang="en-US" dirty="0"/>
+              <a:t>1) Legacy: old Unity animation system</a:t>
             </a:r>
           </a:p>
           <a:p>
             <a:pPr marL="0" indent="0">
               <a:buNone/>
             </a:pPr>
-            <a:endParaRPr lang="en-US" dirty="0" smtClean="0"/>
+            <a:r>
+              <a:rPr lang="en-US" dirty="0"/>
+              <a:t>- You can use it to play / blend / mix animations manually (</a:t>
+            </a:r>
+            <a:r>
+              <a:rPr lang="en-US" dirty="0" err="1"/>
+              <a:t>e.g</a:t>
+            </a:r>
+            <a:r>
+              <a:rPr lang="en-US" dirty="0"/>
+              <a:t> using scripts).</a:t>
+            </a:r>
           </a:p>
           <a:p>
             <a:pPr marL="0" indent="0">
               <a:buNone/>
             </a:pPr>
-            <a:r>
-              <a:rPr lang="en-US" dirty="0" smtClean="0"/>
-              <a:t>2) Setup your lights in the scene: place your Sun, your </a:t>
-            </a:r>
-            <a:r>
-              <a:rPr lang="en-US" dirty="0" err="1" smtClean="0"/>
-              <a:t>realtime</a:t>
-            </a:r>
-            <a:r>
-              <a:rPr lang="en-US" dirty="0" smtClean="0"/>
-              <a:t> lights, </a:t>
-            </a:r>
-            <a:r>
-              <a:rPr lang="en-US" dirty="0" err="1" smtClean="0"/>
-              <a:t>etc</a:t>
-            </a:r>
-            <a:r>
-              <a:rPr lang="en-US" dirty="0" smtClean="0"/>
-              <a:t>…</a:t>
-            </a:r>
-          </a:p>
-          <a:p>
-            <a:r>
-              <a:rPr lang="en-US" dirty="0" smtClean="0"/>
-              <a:t>STATIC LIGHTS SHOULD BE BAKED !</a:t>
-            </a:r>
+            <a:endParaRPr lang="en-US" dirty="0"/>
           </a:p>
           <a:p>
             <a:pPr marL="0" indent="0">
               <a:buNone/>
             </a:pPr>
-            <a:endParaRPr lang="en-US" dirty="0" smtClean="0"/>
+            <a:r>
+              <a:rPr lang="en-US" dirty="0"/>
+              <a:t>2) </a:t>
+            </a:r>
+            <a:r>
+              <a:rPr lang="en-US" dirty="0" err="1"/>
+              <a:t>Mecanim</a:t>
+            </a:r>
+            <a:r>
+              <a:rPr lang="en-US" dirty="0"/>
+              <a:t>: new Unity animation system</a:t>
+            </a:r>
           </a:p>
           <a:p>
             <a:pPr marL="0" indent="0">
               <a:buNone/>
             </a:pPr>
             <a:r>
-              <a:rPr lang="en-US" dirty="0" smtClean="0"/>
-              <a:t>3) Unity GI: Lightning can bounce on surfaces</a:t>
-            </a:r>
-          </a:p>
-          <a:p>
-            <a:r>
-              <a:rPr lang="en-US" dirty="0" smtClean="0"/>
-              <a:t>YOU CAN SPEND YOUR LIFE TUNING LIGHTS !</a:t>
+              <a:rPr lang="en-US" dirty="0"/>
+              <a:t>- Play / blend / mix animations can be done graphically (animations states, blend trees).</a:t>
+            </a:r>
+          </a:p>
+          <a:p>
+            <a:pPr marL="0" indent="0">
+              <a:buNone/>
+            </a:pPr>
+            <a:r>
+              <a:rPr lang="en-US" dirty="0"/>
+              <a:t>- You should use it when dealing with Humanoids:</a:t>
+            </a:r>
+          </a:p>
+          <a:p>
+            <a:pPr marL="0" indent="0">
+              <a:buNone/>
+            </a:pPr>
+            <a:r>
+              <a:rPr lang="en-US" dirty="0"/>
+              <a:t>you can reuse your animations on different avatars !</a:t>
+            </a:r>
+          </a:p>
+          <a:p>
+            <a:pPr marL="0" indent="0">
+              <a:buNone/>
+            </a:pPr>
+            <a:r>
+              <a:rPr lang="en-US" dirty="0"/>
+              <a:t>(motion retargeting)</a:t>
             </a:r>
           </a:p>
         </p:txBody>
@@ -5502,20 +5199,13 @@
     </p:spTree>
     <p:extLst>
       <p:ext uri="{BB962C8B-B14F-4D97-AF65-F5344CB8AC3E}">
-        <p14:creationId xmlns:p14="http://schemas.microsoft.com/office/powerpoint/2010/main" val="1704323172"/>
+        <p14:creationId xmlns:p14="http://schemas.microsoft.com/office/powerpoint/2010/main" val="2245901827"/>
       </p:ext>
     </p:extLst>
   </p:cSld>
   <p:clrMapOvr>
     <a:masterClrMapping/>
   </p:clrMapOvr>
-  <p:timing>
-    <p:tnLst>
-      <p:par>
-        <p:cTn id="1" dur="indefinite" restart="never" nodeType="tmRoot"/>
-      </p:par>
-    </p:tnLst>
-  </p:timing>
 </p:sld>
 </file>
 
@@ -5538,7 +5228,13 @@
       </p:grpSpPr>
       <p:sp>
         <p:nvSpPr>
-          <p:cNvPr id="2" name="Titre 1"/>
+          <p:cNvPr id="2" name="Titre 1">
+            <a:extLst>
+              <a:ext uri="{FF2B5EF4-FFF2-40B4-BE49-F238E27FC236}">
+                <a16:creationId xmlns:a16="http://schemas.microsoft.com/office/drawing/2014/main" id="{6039192D-772A-4225-A898-7022699D3386}"/>
+              </a:ext>
+            </a:extLst>
+          </p:cNvPr>
           <p:cNvSpPr>
             <a:spLocks noGrp="1"/>
           </p:cNvSpPr>
@@ -5546,161 +5242,35 @@
             <p:ph type="title"/>
           </p:nvPr>
         </p:nvSpPr>
-        <p:spPr/>
-        <p:txBody>
-          <a:bodyPr/>
-          <a:lstStyle/>
-          <a:p>
-            <a:r>
-              <a:rPr lang="en-US" dirty="0" smtClean="0"/>
-              <a:t>Animation</a:t>
-            </a:r>
-            <a:endParaRPr lang="en-US" dirty="0"/>
-          </a:p>
-        </p:txBody>
-      </p:sp>
-      <p:sp>
-        <p:nvSpPr>
-          <p:cNvPr id="3" name="Espace réservé du contenu 2"/>
-          <p:cNvSpPr>
-            <a:spLocks noGrp="1"/>
-          </p:cNvSpPr>
-          <p:nvPr>
-            <p:ph idx="1"/>
-          </p:nvPr>
-        </p:nvSpPr>
-        <p:spPr/>
+        <p:spPr>
+          <a:xfrm>
+            <a:off x="457200" y="2857500"/>
+            <a:ext cx="8229600" cy="1143000"/>
+          </a:xfrm>
+        </p:spPr>
         <p:txBody>
           <a:bodyPr>
-            <a:normAutofit fontScale="92500" lnSpcReduction="10000"/>
+            <a:normAutofit/>
           </a:bodyPr>
           <a:lstStyle/>
           <a:p>
-            <a:pPr marL="0" indent="0">
-              <a:buNone/>
-            </a:pPr>
-            <a:r>
-              <a:rPr lang="en-US" dirty="0" smtClean="0"/>
-              <a:t>1) Legacy: old Unity animation system</a:t>
-            </a:r>
-          </a:p>
-          <a:p>
-            <a:pPr marL="0" indent="0">
-              <a:buNone/>
-            </a:pPr>
-            <a:r>
-              <a:rPr lang="en-US" dirty="0" smtClean="0"/>
-              <a:t>- You </a:t>
-            </a:r>
-            <a:r>
-              <a:rPr lang="en-US" dirty="0" smtClean="0"/>
-              <a:t>can use it to play / blend / mix </a:t>
-            </a:r>
-            <a:r>
-              <a:rPr lang="en-US" dirty="0" smtClean="0"/>
-              <a:t>animations manually (</a:t>
-            </a:r>
-            <a:r>
-              <a:rPr lang="en-US" dirty="0" err="1" smtClean="0"/>
-              <a:t>e.g</a:t>
-            </a:r>
-            <a:r>
-              <a:rPr lang="en-US" dirty="0" smtClean="0"/>
-              <a:t> using scripts).</a:t>
-            </a:r>
-            <a:endParaRPr lang="en-US" dirty="0" smtClean="0"/>
-          </a:p>
-          <a:p>
-            <a:pPr marL="0" indent="0">
-              <a:buNone/>
-            </a:pPr>
-            <a:endParaRPr lang="en-US" dirty="0" smtClean="0"/>
-          </a:p>
-          <a:p>
-            <a:pPr marL="0" indent="0">
-              <a:buNone/>
-            </a:pPr>
-            <a:r>
-              <a:rPr lang="en-US" dirty="0" smtClean="0"/>
-              <a:t>2) </a:t>
-            </a:r>
-            <a:r>
-              <a:rPr lang="en-US" dirty="0" err="1" smtClean="0"/>
-              <a:t>Mecanim</a:t>
-            </a:r>
-            <a:r>
-              <a:rPr lang="en-US" dirty="0" smtClean="0"/>
-              <a:t>: new </a:t>
-            </a:r>
-            <a:r>
-              <a:rPr lang="en-US" dirty="0"/>
-              <a:t>Unity animation </a:t>
-            </a:r>
-            <a:r>
-              <a:rPr lang="en-US" dirty="0" smtClean="0"/>
-              <a:t>system</a:t>
-            </a:r>
-          </a:p>
-          <a:p>
-            <a:pPr marL="0" indent="0">
-              <a:buNone/>
-            </a:pPr>
-            <a:r>
-              <a:rPr lang="en-US" dirty="0" smtClean="0"/>
-              <a:t>- Play </a:t>
-            </a:r>
-            <a:r>
-              <a:rPr lang="en-US" dirty="0"/>
-              <a:t>/ blend / mix </a:t>
-            </a:r>
-            <a:r>
-              <a:rPr lang="en-US" dirty="0" smtClean="0"/>
-              <a:t>animations can be done graphically (animations states, blend trees).</a:t>
-            </a:r>
-            <a:endParaRPr lang="en-US" dirty="0" smtClean="0"/>
-          </a:p>
-          <a:p>
-            <a:pPr marL="0" indent="0">
-              <a:buNone/>
-            </a:pPr>
-            <a:r>
-              <a:rPr lang="en-US" dirty="0" smtClean="0"/>
-              <a:t>- You </a:t>
-            </a:r>
-            <a:r>
-              <a:rPr lang="en-US" dirty="0" smtClean="0"/>
-              <a:t>should use it when dealing with Humanoids:</a:t>
-            </a:r>
-          </a:p>
-          <a:p>
-            <a:pPr marL="0" indent="0">
-              <a:buNone/>
-            </a:pPr>
-            <a:r>
-              <a:rPr lang="en-US" dirty="0" smtClean="0"/>
-              <a:t>you can reuse your animations on different avatars !</a:t>
-            </a:r>
-            <a:endParaRPr lang="en-US" dirty="0"/>
+            <a:r>
+              <a:rPr lang="fr-FR" dirty="0"/>
+              <a:t>Annexes</a:t>
+            </a:r>
           </a:p>
         </p:txBody>
       </p:sp>
     </p:spTree>
     <p:extLst>
       <p:ext uri="{BB962C8B-B14F-4D97-AF65-F5344CB8AC3E}">
-        <p14:creationId xmlns:p14="http://schemas.microsoft.com/office/powerpoint/2010/main" val="2245901827"/>
+        <p14:creationId xmlns:p14="http://schemas.microsoft.com/office/powerpoint/2010/main" val="2197944602"/>
       </p:ext>
     </p:extLst>
   </p:cSld>
   <p:clrMapOvr>
     <a:masterClrMapping/>
   </p:clrMapOvr>
-  <p:timing>
-    <p:tnLst>
-      <p:par>
-        <p:cTn id="1" dur="indefinite" restart="never" nodeType="tmRoot"/>
-      </p:par>
-    </p:tnLst>
-  </p:timing>
 </p:sld>
 </file>
 
@@ -5985,4 +5555,299 @@
   <a:objectDefaults/>
   <a:extraClrSchemeLst/>
 </a:theme>
+</file>
+
+<file path=ppt/theme/theme2.xml><?xml version="1.0" encoding="utf-8"?>
+<a:theme xmlns:a="http://schemas.openxmlformats.org/drawingml/2006/main" name="Thème Office">
+  <a:themeElements>
+    <a:clrScheme name="Office">
+      <a:dk1>
+        <a:sysClr val="windowText" lastClr="000000"/>
+      </a:dk1>
+      <a:lt1>
+        <a:sysClr val="window" lastClr="FFFFFF"/>
+      </a:lt1>
+      <a:dk2>
+        <a:srgbClr val="44546A"/>
+      </a:dk2>
+      <a:lt2>
+        <a:srgbClr val="E7E6E6"/>
+      </a:lt2>
+      <a:accent1>
+        <a:srgbClr val="4472C4"/>
+      </a:accent1>
+      <a:accent2>
+        <a:srgbClr val="ED7D31"/>
+      </a:accent2>
+      <a:accent3>
+        <a:srgbClr val="A5A5A5"/>
+      </a:accent3>
+      <a:accent4>
+        <a:srgbClr val="FFC000"/>
+      </a:accent4>
+      <a:accent5>
+        <a:srgbClr val="5B9BD5"/>
+      </a:accent5>
+      <a:accent6>
+        <a:srgbClr val="70AD47"/>
+      </a:accent6>
+      <a:hlink>
+        <a:srgbClr val="0563C1"/>
+      </a:hlink>
+      <a:folHlink>
+        <a:srgbClr val="954F72"/>
+      </a:folHlink>
+    </a:clrScheme>
+    <a:fontScheme name="Office">
+      <a:majorFont>
+        <a:latin typeface="Calibri Light" panose="020F0302020204030204"/>
+        <a:ea typeface=""/>
+        <a:cs typeface=""/>
+        <a:font script="Jpan" typeface="游ゴシック Light"/>
+        <a:font script="Hang" typeface="맑은 고딕"/>
+        <a:font script="Hans" typeface="等线 Light"/>
+        <a:font script="Hant" typeface="新細明體"/>
+        <a:font script="Arab" typeface="Times New Roman"/>
+        <a:font script="Hebr" typeface="Times New Roman"/>
+        <a:font script="Thai" typeface="Angsana New"/>
+        <a:font script="Ethi" typeface="Nyala"/>
+        <a:font script="Beng" typeface="Vrinda"/>
+        <a:font script="Gujr" typeface="Shruti"/>
+        <a:font script="Khmr" typeface="MoolBoran"/>
+        <a:font script="Knda" typeface="Tunga"/>
+        <a:font script="Guru" typeface="Raavi"/>
+        <a:font script="Cans" typeface="Euphemia"/>
+        <a:font script="Cher" typeface="Plantagenet Cherokee"/>
+        <a:font script="Yiii" typeface="Microsoft Yi Baiti"/>
+        <a:font script="Tibt" typeface="Microsoft Himalaya"/>
+        <a:font script="Thaa" typeface="MV Boli"/>
+        <a:font script="Deva" typeface="Mangal"/>
+        <a:font script="Telu" typeface="Gautami"/>
+        <a:font script="Taml" typeface="Latha"/>
+        <a:font script="Syrc" typeface="Estrangelo Edessa"/>
+        <a:font script="Orya" typeface="Kalinga"/>
+        <a:font script="Mlym" typeface="Kartika"/>
+        <a:font script="Laoo" typeface="DokChampa"/>
+        <a:font script="Sinh" typeface="Iskoola Pota"/>
+        <a:font script="Mong" typeface="Mongolian Baiti"/>
+        <a:font script="Viet" typeface="Times New Roman"/>
+        <a:font script="Uigh" typeface="Microsoft Uighur"/>
+        <a:font script="Geor" typeface="Sylfaen"/>
+        <a:font script="Armn" typeface="Arial"/>
+        <a:font script="Bugi" typeface="Leelawadee UI"/>
+        <a:font script="Bopo" typeface="Microsoft JhengHei"/>
+        <a:font script="Java" typeface="Javanese Text"/>
+        <a:font script="Lisu" typeface="Segoe UI"/>
+        <a:font script="Mymr" typeface="Myanmar Text"/>
+        <a:font script="Nkoo" typeface="Ebrima"/>
+        <a:font script="Olck" typeface="Nirmala UI"/>
+        <a:font script="Osma" typeface="Ebrima"/>
+        <a:font script="Phag" typeface="Phagspa"/>
+        <a:font script="Syrn" typeface="Estrangelo Edessa"/>
+        <a:font script="Syrj" typeface="Estrangelo Edessa"/>
+        <a:font script="Syre" typeface="Estrangelo Edessa"/>
+        <a:font script="Sora" typeface="Nirmala UI"/>
+        <a:font script="Tale" typeface="Microsoft Tai Le"/>
+        <a:font script="Talu" typeface="Microsoft New Tai Lue"/>
+        <a:font script="Tfng" typeface="Ebrima"/>
+      </a:majorFont>
+      <a:minorFont>
+        <a:latin typeface="Calibri" panose="020F0502020204030204"/>
+        <a:ea typeface=""/>
+        <a:cs typeface=""/>
+        <a:font script="Jpan" typeface="游ゴシック"/>
+        <a:font script="Hang" typeface="맑은 고딕"/>
+        <a:font script="Hans" typeface="等线"/>
+        <a:font script="Hant" typeface="新細明體"/>
+        <a:font script="Arab" typeface="Arial"/>
+        <a:font script="Hebr" typeface="Arial"/>
+        <a:font script="Thai" typeface="Cordia New"/>
+        <a:font script="Ethi" typeface="Nyala"/>
+        <a:font script="Beng" typeface="Vrinda"/>
+        <a:font script="Gujr" typeface="Shruti"/>
+        <a:font script="Khmr" typeface="DaunPenh"/>
+        <a:font script="Knda" typeface="Tunga"/>
+        <a:font script="Guru" typeface="Raavi"/>
+        <a:font script="Cans" typeface="Euphemia"/>
+        <a:font script="Cher" typeface="Plantagenet Cherokee"/>
+        <a:font script="Yiii" typeface="Microsoft Yi Baiti"/>
+        <a:font script="Tibt" typeface="Microsoft Himalaya"/>
+        <a:font script="Thaa" typeface="MV Boli"/>
+        <a:font script="Deva" typeface="Mangal"/>
+        <a:font script="Telu" typeface="Gautami"/>
+        <a:font script="Taml" typeface="Latha"/>
+        <a:font script="Syrc" typeface="Estrangelo Edessa"/>
+        <a:font script="Orya" typeface="Kalinga"/>
+        <a:font script="Mlym" typeface="Kartika"/>
+        <a:font script="Laoo" typeface="DokChampa"/>
+        <a:font script="Sinh" typeface="Iskoola Pota"/>
+        <a:font script="Mong" typeface="Mongolian Baiti"/>
+        <a:font script="Viet" typeface="Arial"/>
+        <a:font script="Uigh" typeface="Microsoft Uighur"/>
+        <a:font script="Geor" typeface="Sylfaen"/>
+        <a:font script="Armn" typeface="Arial"/>
+        <a:font script="Bugi" typeface="Leelawadee UI"/>
+        <a:font script="Bopo" typeface="Microsoft JhengHei"/>
+        <a:font script="Java" typeface="Javanese Text"/>
+        <a:font script="Lisu" typeface="Segoe UI"/>
+        <a:font script="Mymr" typeface="Myanmar Text"/>
+        <a:font script="Nkoo" typeface="Ebrima"/>
+        <a:font script="Olck" typeface="Nirmala UI"/>
+        <a:font script="Osma" typeface="Ebrima"/>
+        <a:font script="Phag" typeface="Phagspa"/>
+        <a:font script="Syrn" typeface="Estrangelo Edessa"/>
+        <a:font script="Syrj" typeface="Estrangelo Edessa"/>
+        <a:font script="Syre" typeface="Estrangelo Edessa"/>
+        <a:font script="Sora" typeface="Nirmala UI"/>
+        <a:font script="Tale" typeface="Microsoft Tai Le"/>
+        <a:font script="Talu" typeface="Microsoft New Tai Lue"/>
+        <a:font script="Tfng" typeface="Ebrima"/>
+      </a:minorFont>
+    </a:fontScheme>
+    <a:fmtScheme name="Office">
+      <a:fillStyleLst>
+        <a:solidFill>
+          <a:schemeClr val="phClr"/>
+        </a:solidFill>
+        <a:gradFill rotWithShape="1">
+          <a:gsLst>
+            <a:gs pos="0">
+              <a:schemeClr val="phClr">
+                <a:lumMod val="110000"/>
+                <a:satMod val="105000"/>
+                <a:tint val="67000"/>
+              </a:schemeClr>
+            </a:gs>
+            <a:gs pos="50000">
+              <a:schemeClr val="phClr">
+                <a:lumMod val="105000"/>
+                <a:satMod val="103000"/>
+                <a:tint val="73000"/>
+              </a:schemeClr>
+            </a:gs>
+            <a:gs pos="100000">
+              <a:schemeClr val="phClr">
+                <a:lumMod val="105000"/>
+                <a:satMod val="109000"/>
+                <a:tint val="81000"/>
+              </a:schemeClr>
+            </a:gs>
+          </a:gsLst>
+          <a:lin ang="5400000" scaled="0"/>
+        </a:gradFill>
+        <a:gradFill rotWithShape="1">
+          <a:gsLst>
+            <a:gs pos="0">
+              <a:schemeClr val="phClr">
+                <a:satMod val="103000"/>
+                <a:lumMod val="102000"/>
+                <a:tint val="94000"/>
+              </a:schemeClr>
+            </a:gs>
+            <a:gs pos="50000">
+              <a:schemeClr val="phClr">
+                <a:satMod val="110000"/>
+                <a:lumMod val="100000"/>
+                <a:shade val="100000"/>
+              </a:schemeClr>
+            </a:gs>
+            <a:gs pos="100000">
+              <a:schemeClr val="phClr">
+                <a:lumMod val="99000"/>
+                <a:satMod val="120000"/>
+                <a:shade val="78000"/>
+              </a:schemeClr>
+            </a:gs>
+          </a:gsLst>
+          <a:lin ang="5400000" scaled="0"/>
+        </a:gradFill>
+      </a:fillStyleLst>
+      <a:lnStyleLst>
+        <a:ln w="6350" cap="flat" cmpd="sng" algn="ctr">
+          <a:solidFill>
+            <a:schemeClr val="phClr"/>
+          </a:solidFill>
+          <a:prstDash val="solid"/>
+          <a:miter lim="800000"/>
+        </a:ln>
+        <a:ln w="12700" cap="flat" cmpd="sng" algn="ctr">
+          <a:solidFill>
+            <a:schemeClr val="phClr"/>
+          </a:solidFill>
+          <a:prstDash val="solid"/>
+          <a:miter lim="800000"/>
+        </a:ln>
+        <a:ln w="19050" cap="flat" cmpd="sng" algn="ctr">
+          <a:solidFill>
+            <a:schemeClr val="phClr"/>
+          </a:solidFill>
+          <a:prstDash val="solid"/>
+          <a:miter lim="800000"/>
+        </a:ln>
+      </a:lnStyleLst>
+      <a:effectStyleLst>
+        <a:effectStyle>
+          <a:effectLst/>
+        </a:effectStyle>
+        <a:effectStyle>
+          <a:effectLst/>
+        </a:effectStyle>
+        <a:effectStyle>
+          <a:effectLst>
+            <a:outerShdw blurRad="57150" dist="19050" dir="5400000" algn="ctr" rotWithShape="0">
+              <a:srgbClr val="000000">
+                <a:alpha val="63000"/>
+              </a:srgbClr>
+            </a:outerShdw>
+          </a:effectLst>
+        </a:effectStyle>
+      </a:effectStyleLst>
+      <a:bgFillStyleLst>
+        <a:solidFill>
+          <a:schemeClr val="phClr"/>
+        </a:solidFill>
+        <a:solidFill>
+          <a:schemeClr val="phClr">
+            <a:tint val="95000"/>
+            <a:satMod val="170000"/>
+          </a:schemeClr>
+        </a:solidFill>
+        <a:gradFill rotWithShape="1">
+          <a:gsLst>
+            <a:gs pos="0">
+              <a:schemeClr val="phClr">
+                <a:tint val="93000"/>
+                <a:satMod val="150000"/>
+                <a:shade val="98000"/>
+                <a:lumMod val="102000"/>
+              </a:schemeClr>
+            </a:gs>
+            <a:gs pos="50000">
+              <a:schemeClr val="phClr">
+                <a:tint val="98000"/>
+                <a:satMod val="130000"/>
+                <a:shade val="90000"/>
+                <a:lumMod val="103000"/>
+              </a:schemeClr>
+            </a:gs>
+            <a:gs pos="100000">
+              <a:schemeClr val="phClr">
+                <a:shade val="63000"/>
+                <a:satMod val="120000"/>
+              </a:schemeClr>
+            </a:gs>
+          </a:gsLst>
+          <a:lin ang="5400000" scaled="0"/>
+        </a:gradFill>
+      </a:bgFillStyleLst>
+    </a:fmtScheme>
+  </a:themeElements>
+  <a:objectDefaults/>
+  <a:extraClrSchemeLst/>
+  <a:extLst>
+    <a:ext uri="{05A4C25C-085E-4340-85A3-A5531E510DB2}">
+      <thm15:themeFamily xmlns:thm15="http://schemas.microsoft.com/office/thememl/2012/main" name="Office Theme" id="{62F939B6-93AF-4DB8-9C6B-D6C7DFDC589F}" vid="{4A3C46E8-61CC-4603-A589-7422A47A8E4A}"/>
+    </a:ext>
+  </a:extLst>
+</a:theme>
 </file>
</xml_diff>